<commit_message>
add comment to the slides
</commit_message>
<xml_diff>
--- a/SAP_2017_16x9_black_and_white.pptx
+++ b/SAP_2017_16x9_black_and_white.pptx
@@ -5,10 +5,10 @@
     <p:sldMasterId id="2147483733" r:id="rId1"/>
   </p:sldMasterIdLst>
   <p:notesMasterIdLst>
-    <p:notesMasterId r:id="rId30"/>
+    <p:notesMasterId r:id="rId31"/>
   </p:notesMasterIdLst>
   <p:handoutMasterIdLst>
-    <p:handoutMasterId r:id="rId31"/>
+    <p:handoutMasterId r:id="rId32"/>
   </p:handoutMasterIdLst>
   <p:sldIdLst>
     <p:sldId id="434" r:id="rId2"/>
@@ -16,29 +16,30 @@
     <p:sldId id="416" r:id="rId4"/>
     <p:sldId id="435" r:id="rId5"/>
     <p:sldId id="438" r:id="rId6"/>
-    <p:sldId id="437" r:id="rId7"/>
-    <p:sldId id="439" r:id="rId8"/>
-    <p:sldId id="447" r:id="rId9"/>
-    <p:sldId id="440" r:id="rId10"/>
-    <p:sldId id="441" r:id="rId11"/>
-    <p:sldId id="454" r:id="rId12"/>
-    <p:sldId id="448" r:id="rId13"/>
-    <p:sldId id="382" r:id="rId14"/>
-    <p:sldId id="388" r:id="rId15"/>
-    <p:sldId id="442" r:id="rId16"/>
-    <p:sldId id="443" r:id="rId17"/>
-    <p:sldId id="446" r:id="rId18"/>
-    <p:sldId id="455" r:id="rId19"/>
-    <p:sldId id="461" r:id="rId20"/>
-    <p:sldId id="462" r:id="rId21"/>
-    <p:sldId id="450" r:id="rId22"/>
-    <p:sldId id="445" r:id="rId23"/>
-    <p:sldId id="452" r:id="rId24"/>
-    <p:sldId id="430" r:id="rId25"/>
-    <p:sldId id="374" r:id="rId26"/>
-    <p:sldId id="453" r:id="rId27"/>
-    <p:sldId id="413" r:id="rId28"/>
-    <p:sldId id="265" r:id="rId29"/>
+    <p:sldId id="463" r:id="rId7"/>
+    <p:sldId id="437" r:id="rId8"/>
+    <p:sldId id="439" r:id="rId9"/>
+    <p:sldId id="447" r:id="rId10"/>
+    <p:sldId id="440" r:id="rId11"/>
+    <p:sldId id="441" r:id="rId12"/>
+    <p:sldId id="454" r:id="rId13"/>
+    <p:sldId id="448" r:id="rId14"/>
+    <p:sldId id="382" r:id="rId15"/>
+    <p:sldId id="388" r:id="rId16"/>
+    <p:sldId id="442" r:id="rId17"/>
+    <p:sldId id="443" r:id="rId18"/>
+    <p:sldId id="446" r:id="rId19"/>
+    <p:sldId id="455" r:id="rId20"/>
+    <p:sldId id="461" r:id="rId21"/>
+    <p:sldId id="462" r:id="rId22"/>
+    <p:sldId id="450" r:id="rId23"/>
+    <p:sldId id="445" r:id="rId24"/>
+    <p:sldId id="452" r:id="rId25"/>
+    <p:sldId id="430" r:id="rId26"/>
+    <p:sldId id="374" r:id="rId27"/>
+    <p:sldId id="453" r:id="rId28"/>
+    <p:sldId id="413" r:id="rId29"/>
+    <p:sldId id="265" r:id="rId30"/>
   </p:sldIdLst>
   <p:sldSz cx="12195175" cy="6858000"/>
   <p:notesSz cx="6858000" cy="9144000"/>
@@ -258,7 +259,7 @@
               <a:cs typeface="+mn-cs"/>
             </a:defRPr>
           </a:pPr>
-          <a:endParaRPr lang="zh-CN"/>
+          <a:endParaRPr lang="en-US"/>
         </a:p>
       </c:txPr>
     </c:title>
@@ -443,7 +444,7 @@
               <a:cs typeface="+mn-cs"/>
             </a:defRPr>
           </a:pPr>
-          <a:endParaRPr lang="zh-CN"/>
+          <a:endParaRPr lang="en-US"/>
         </a:p>
       </c:txPr>
     </c:legend>
@@ -465,7 +466,7 @@
       <a:pPr>
         <a:defRPr/>
       </a:pPr>
-      <a:endParaRPr lang="zh-CN"/>
+      <a:endParaRPr lang="en-US"/>
     </a:p>
   </c:txPr>
   <c:externalData r:id="rId3">
@@ -514,7 +515,7 @@
               <a:cs typeface="+mn-cs"/>
             </a:defRPr>
           </a:pPr>
-          <a:endParaRPr lang="zh-CN"/>
+          <a:endParaRPr lang="en-US"/>
         </a:p>
       </c:txPr>
     </c:title>
@@ -699,7 +700,7 @@
               <a:cs typeface="+mn-cs"/>
             </a:defRPr>
           </a:pPr>
-          <a:endParaRPr lang="zh-CN"/>
+          <a:endParaRPr lang="en-US"/>
         </a:p>
       </c:txPr>
     </c:legend>
@@ -721,7 +722,7 @@
       <a:pPr>
         <a:defRPr/>
       </a:pPr>
-      <a:endParaRPr lang="zh-CN"/>
+      <a:endParaRPr lang="en-US"/>
     </a:p>
   </c:txPr>
   <c:externalData r:id="rId3">
@@ -2481,6 +2482,41 @@
       </p:grpSpPr>
       <p:sp>
         <p:nvSpPr>
+          <p:cNvPr id="2" name="Slide Image Placeholder 1"/>
+          <p:cNvSpPr>
+            <a:spLocks noGrp="1" noRot="1" noChangeAspect="1"/>
+          </p:cNvSpPr>
+          <p:nvPr>
+            <p:ph type="sldImg"/>
+          </p:nvPr>
+        </p:nvSpPr>
+        <p:spPr/>
+      </p:sp>
+      <p:sp>
+        <p:nvSpPr>
+          <p:cNvPr id="3" name="Notes Placeholder 2"/>
+          <p:cNvSpPr>
+            <a:spLocks noGrp="1"/>
+          </p:cNvSpPr>
+          <p:nvPr>
+            <p:ph type="body" idx="1"/>
+          </p:nvPr>
+        </p:nvSpPr>
+        <p:spPr/>
+        <p:txBody>
+          <a:bodyPr/>
+          <a:lstStyle/>
+          <a:p>
+            <a:r>
+              <a:rPr lang="en-CA" dirty="0"/>
+              <a:t>Hello everyone, today I am very happy to introduce my QM application for you. Since it is deployed on HCP so it is powered by HANA Cloud. </a:t>
+            </a:r>
+            <a:endParaRPr lang="en-US" dirty="0"/>
+          </a:p>
+        </p:txBody>
+      </p:sp>
+      <p:sp>
+        <p:nvSpPr>
           <p:cNvPr id="4" name="Slide Number Placeholder 3"/>
           <p:cNvSpPr>
             <a:spLocks noGrp="1"/>
@@ -2497,54 +2533,16 @@
             <a:fld id="{7D8C2C35-2B8A-446E-BEC0-FD36716C29AC}" type="slidenum">
               <a:rPr lang="de-DE" smtClean="0"/>
               <a:pPr/>
-              <a:t>2</a:t>
+              <a:t>1</a:t>
             </a:fld>
             <a:endParaRPr lang="de-DE" dirty="0"/>
-          </a:p>
-        </p:txBody>
-      </p:sp>
-      <p:sp>
-        <p:nvSpPr>
-          <p:cNvPr id="9" name="Slide Image Placeholder 8"/>
-          <p:cNvSpPr>
-            <a:spLocks noGrp="1" noRot="1" noChangeAspect="1"/>
-          </p:cNvSpPr>
-          <p:nvPr>
-            <p:ph type="sldImg"/>
-          </p:nvPr>
-        </p:nvSpPr>
-        <p:spPr>
-          <a:xfrm>
-            <a:off x="547688" y="612775"/>
-            <a:ext cx="5762625" cy="3241675"/>
-          </a:xfrm>
-        </p:spPr>
-      </p:sp>
-      <p:sp>
-        <p:nvSpPr>
-          <p:cNvPr id="10" name="Notes Placeholder 9"/>
-          <p:cNvSpPr>
-            <a:spLocks noGrp="1"/>
-          </p:cNvSpPr>
-          <p:nvPr>
-            <p:ph type="body" idx="1"/>
-          </p:nvPr>
-        </p:nvSpPr>
-        <p:spPr/>
-        <p:txBody>
-          <a:bodyPr>
-            <a:normAutofit/>
-          </a:bodyPr>
-          <a:lstStyle/>
-          <a:p>
-            <a:endParaRPr lang="en-US" dirty="0"/>
           </a:p>
         </p:txBody>
       </p:sp>
     </p:spTree>
     <p:extLst>
       <p:ext uri="{BB962C8B-B14F-4D97-AF65-F5344CB8AC3E}">
-        <p14:creationId xmlns:p14="http://schemas.microsoft.com/office/powerpoint/2010/main" val="979621955"/>
+        <p14:creationId xmlns:p14="http://schemas.microsoft.com/office/powerpoint/2010/main" val="1845697157"/>
       </p:ext>
     </p:extLst>
   </p:cSld>
@@ -2599,22 +2597,9 @@
           <a:lstStyle/>
           <a:p>
             <a:r>
-              <a:rPr lang="en-US" altLang="zh-CN" dirty="0"/>
-              <a:t>How to avoid </a:t>
-            </a:r>
-            <a:r>
-              <a:rPr lang="zh-CN" altLang="en-US" dirty="0"/>
-              <a:t>缺陷</a:t>
-            </a:r>
-            <a:r>
-              <a:rPr lang="en-US" altLang="zh-CN" dirty="0"/>
-              <a:t>, extends </a:t>
-            </a:r>
-            <a:r>
-              <a:rPr lang="zh-CN" altLang="en-US" dirty="0"/>
-              <a:t>优点？</a:t>
-            </a:r>
-            <a:endParaRPr lang="en-US" dirty="0"/>
+              <a:rPr lang="en-US" dirty="0"/>
+              <a:t>Our old friend, BCP. Do not have counter function.</a:t>
+            </a:r>
           </a:p>
         </p:txBody>
       </p:sp>
@@ -2636,7 +2621,7 @@
             <a:fld id="{7D8C2C35-2B8A-446E-BEC0-FD36716C29AC}" type="slidenum">
               <a:rPr lang="de-DE" smtClean="0"/>
               <a:pPr/>
-              <a:t>12</a:t>
+              <a:t>10</a:t>
             </a:fld>
             <a:endParaRPr lang="de-DE" dirty="0"/>
           </a:p>
@@ -2645,7 +2630,7 @@
     </p:spTree>
     <p:extLst>
       <p:ext uri="{BB962C8B-B14F-4D97-AF65-F5344CB8AC3E}">
-        <p14:creationId xmlns:p14="http://schemas.microsoft.com/office/powerpoint/2010/main" val="1009616146"/>
+        <p14:creationId xmlns:p14="http://schemas.microsoft.com/office/powerpoint/2010/main" val="2773265381"/>
       </p:ext>
     </p:extLst>
   </p:cSld>
@@ -2700,20 +2685,12 @@
           <a:lstStyle/>
           <a:p>
             <a:r>
-              <a:rPr lang="zh-CN" altLang="en-US" dirty="0"/>
-              <a:t>总结到以上几点，</a:t>
-            </a:r>
-            <a:r>
               <a:rPr lang="en-US" altLang="zh-CN" dirty="0"/>
-              <a:t>xxx</a:t>
-            </a:r>
-            <a:r>
-              <a:rPr lang="zh-CN" altLang="en-US" dirty="0"/>
-              <a:t>，</a:t>
+              <a:t>That is what we are using. But its disadvantages are apparently. Distributed </a:t>
             </a:r>
             <a:r>
               <a:rPr lang="en-US" dirty="0"/>
-              <a:t>Then how to combine them into one product?</a:t>
+              <a:t>Numbers, numbers, numbers! Repeat logon request</a:t>
             </a:r>
           </a:p>
         </p:txBody>
@@ -2736,7 +2713,7 @@
             <a:fld id="{7D8C2C35-2B8A-446E-BEC0-FD36716C29AC}" type="slidenum">
               <a:rPr lang="de-DE" smtClean="0"/>
               <a:pPr/>
-              <a:t>13</a:t>
+              <a:t>11</a:t>
             </a:fld>
             <a:endParaRPr lang="de-DE" dirty="0"/>
           </a:p>
@@ -2745,7 +2722,7 @@
     </p:spTree>
     <p:extLst>
       <p:ext uri="{BB962C8B-B14F-4D97-AF65-F5344CB8AC3E}">
-        <p14:creationId xmlns:p14="http://schemas.microsoft.com/office/powerpoint/2010/main" val="4225349832"/>
+        <p14:creationId xmlns:p14="http://schemas.microsoft.com/office/powerpoint/2010/main" val="395136101"/>
       </p:ext>
     </p:extLst>
   </p:cSld>
@@ -2801,23 +2778,7 @@
           <a:p>
             <a:r>
               <a:rPr lang="en-US" dirty="0"/>
-              <a:t>Web: access anywhere and avoid</a:t>
-            </a:r>
-            <a:r>
-              <a:rPr lang="en-US" baseline="0" dirty="0"/>
-              <a:t> the situation that engineer forgot to handover</a:t>
-            </a:r>
-          </a:p>
-          <a:p>
-            <a:r>
-              <a:rPr lang="en-US" baseline="0" dirty="0"/>
-              <a:t>Name list: easy to find engineer and maintain</a:t>
-            </a:r>
-          </a:p>
-          <a:p>
-            <a:r>
-              <a:rPr lang="en-US" baseline="0" dirty="0"/>
-              <a:t>Counter: know who to assign</a:t>
+              <a:t>And also, sometimes engineer would forget to handover, and next shift has to send query email to every single person</a:t>
             </a:r>
           </a:p>
         </p:txBody>
@@ -2840,7 +2801,7 @@
             <a:fld id="{7D8C2C35-2B8A-446E-BEC0-FD36716C29AC}" type="slidenum">
               <a:rPr lang="de-DE" smtClean="0"/>
               <a:pPr/>
-              <a:t>14</a:t>
+              <a:t>12</a:t>
             </a:fld>
             <a:endParaRPr lang="de-DE" dirty="0"/>
           </a:p>
@@ -2849,7 +2810,7 @@
     </p:spTree>
     <p:extLst>
       <p:ext uri="{BB962C8B-B14F-4D97-AF65-F5344CB8AC3E}">
-        <p14:creationId xmlns:p14="http://schemas.microsoft.com/office/powerpoint/2010/main" val="987817779"/>
+        <p14:creationId xmlns:p14="http://schemas.microsoft.com/office/powerpoint/2010/main" val="1396010178"/>
       </p:ext>
     </p:extLst>
   </p:cSld>
@@ -2904,12 +2865,16 @@
           <a:lstStyle/>
           <a:p>
             <a:r>
-              <a:rPr lang="en-US" dirty="0"/>
-              <a:t>Separate</a:t>
-            </a:r>
-            <a:r>
-              <a:rPr lang="en-US" baseline="0" dirty="0"/>
-              <a:t> numbers and be more clearly</a:t>
+              <a:rPr lang="en-US" altLang="zh-CN" dirty="0"/>
+              <a:t>Then I was thinking, I am the programming student and why not just create one app? Then I need to decide how to avoid shortages, extends benefits from those existed </a:t>
+            </a:r>
+            <a:r>
+              <a:rPr lang="en-US" altLang="zh-CN" dirty="0" err="1"/>
+              <a:t>applicaitons</a:t>
+            </a:r>
+            <a:r>
+              <a:rPr lang="en-US" altLang="zh-CN" dirty="0"/>
+              <a:t>?</a:t>
             </a:r>
             <a:endParaRPr lang="en-US" dirty="0"/>
           </a:p>
@@ -2933,7 +2898,7 @@
             <a:fld id="{7D8C2C35-2B8A-446E-BEC0-FD36716C29AC}" type="slidenum">
               <a:rPr lang="de-DE" smtClean="0"/>
               <a:pPr/>
-              <a:t>15</a:t>
+              <a:t>13</a:t>
             </a:fld>
             <a:endParaRPr lang="de-DE" dirty="0"/>
           </a:p>
@@ -2942,7 +2907,7 @@
     </p:spTree>
     <p:extLst>
       <p:ext uri="{BB962C8B-B14F-4D97-AF65-F5344CB8AC3E}">
-        <p14:creationId xmlns:p14="http://schemas.microsoft.com/office/powerpoint/2010/main" val="1998870921"/>
+        <p14:creationId xmlns:p14="http://schemas.microsoft.com/office/powerpoint/2010/main" val="1009616146"/>
       </p:ext>
     </p:extLst>
   </p:cSld>
@@ -2997,14 +2962,21 @@
           <a:lstStyle/>
           <a:p>
             <a:r>
+              <a:rPr lang="zh-CN" altLang="en-US" dirty="0"/>
+              <a:t>总结到以上几点，</a:t>
+            </a:r>
+            <a:r>
+              <a:rPr lang="en-US" altLang="zh-CN" dirty="0"/>
+              <a:t>xxx</a:t>
+            </a:r>
+            <a:r>
+              <a:rPr lang="zh-CN" altLang="en-US" dirty="0"/>
+              <a:t>，</a:t>
+            </a:r>
+            <a:r>
               <a:rPr lang="en-US" dirty="0"/>
-              <a:t>Since all engineers</a:t>
-            </a:r>
-            <a:r>
-              <a:rPr lang="en-US" baseline="0" dirty="0"/>
-              <a:t> support NW and EPM add-in, then this component would be on the Home Page for the fastest accessing</a:t>
-            </a:r>
-            <a:endParaRPr lang="en-US" dirty="0"/>
+              <a:t>Then how to combine them into one product?</a:t>
+            </a:r>
           </a:p>
         </p:txBody>
       </p:sp>
@@ -3026,7 +2998,7 @@
             <a:fld id="{7D8C2C35-2B8A-446E-BEC0-FD36716C29AC}" type="slidenum">
               <a:rPr lang="de-DE" smtClean="0"/>
               <a:pPr/>
-              <a:t>17</a:t>
+              <a:t>14</a:t>
             </a:fld>
             <a:endParaRPr lang="de-DE" dirty="0"/>
           </a:p>
@@ -3035,7 +3007,7 @@
     </p:spTree>
     <p:extLst>
       <p:ext uri="{BB962C8B-B14F-4D97-AF65-F5344CB8AC3E}">
-        <p14:creationId xmlns:p14="http://schemas.microsoft.com/office/powerpoint/2010/main" val="2051000623"/>
+        <p14:creationId xmlns:p14="http://schemas.microsoft.com/office/powerpoint/2010/main" val="4225349832"/>
       </p:ext>
     </p:extLst>
   </p:cSld>
@@ -3091,25 +3063,24 @@
           <a:p>
             <a:r>
               <a:rPr lang="en-US" dirty="0"/>
-              <a:t>Automatically</a:t>
+              <a:t>Web: access anywhere and avoid</a:t>
             </a:r>
             <a:r>
               <a:rPr lang="en-US" baseline="0" dirty="0"/>
-              <a:t> recommend the next </a:t>
-            </a:r>
-            <a:r>
-              <a:rPr lang="en-US" sz="1400" b="0" i="0" kern="1200" dirty="0">
-                <a:solidFill>
-                  <a:schemeClr val="tx1"/>
-                </a:solidFill>
-                <a:effectLst/>
-                <a:latin typeface="+mn-lt"/>
-                <a:ea typeface="+mn-ea"/>
-                <a:cs typeface="+mn-cs"/>
-              </a:rPr>
-              <a:t>candidate</a:t>
-            </a:r>
-            <a:endParaRPr lang="en-US" dirty="0"/>
+              <a:t> the situation that engineer forgot to handover</a:t>
+            </a:r>
+          </a:p>
+          <a:p>
+            <a:r>
+              <a:rPr lang="en-US" baseline="0" dirty="0"/>
+              <a:t>Name list: easy to find engineer and maintain</a:t>
+            </a:r>
+          </a:p>
+          <a:p>
+            <a:r>
+              <a:rPr lang="en-US" baseline="0" dirty="0"/>
+              <a:t>Counter: know who to assign</a:t>
+            </a:r>
           </a:p>
         </p:txBody>
       </p:sp>
@@ -3131,7 +3102,7 @@
             <a:fld id="{7D8C2C35-2B8A-446E-BEC0-FD36716C29AC}" type="slidenum">
               <a:rPr lang="de-DE" smtClean="0"/>
               <a:pPr/>
-              <a:t>18</a:t>
+              <a:t>15</a:t>
             </a:fld>
             <a:endParaRPr lang="de-DE" dirty="0"/>
           </a:p>
@@ -3140,7 +3111,7 @@
     </p:spTree>
     <p:extLst>
       <p:ext uri="{BB962C8B-B14F-4D97-AF65-F5344CB8AC3E}">
-        <p14:creationId xmlns:p14="http://schemas.microsoft.com/office/powerpoint/2010/main" val="981962001"/>
+        <p14:creationId xmlns:p14="http://schemas.microsoft.com/office/powerpoint/2010/main" val="987817779"/>
       </p:ext>
     </p:extLst>
   </p:cSld>
@@ -3196,11 +3167,11 @@
           <a:p>
             <a:r>
               <a:rPr lang="en-US" dirty="0"/>
-              <a:t>Engineer</a:t>
+              <a:t>Separate</a:t>
             </a:r>
             <a:r>
               <a:rPr lang="en-US" baseline="0" dirty="0"/>
-              <a:t> will not be filtered if it is unavailable. </a:t>
+              <a:t> numbers and be more clearly</a:t>
             </a:r>
             <a:endParaRPr lang="en-US" dirty="0"/>
           </a:p>
@@ -3224,7 +3195,7 @@
             <a:fld id="{7D8C2C35-2B8A-446E-BEC0-FD36716C29AC}" type="slidenum">
               <a:rPr lang="de-DE" smtClean="0"/>
               <a:pPr/>
-              <a:t>19</a:t>
+              <a:t>16</a:t>
             </a:fld>
             <a:endParaRPr lang="de-DE" dirty="0"/>
           </a:p>
@@ -3233,7 +3204,7 @@
     </p:spTree>
     <p:extLst>
       <p:ext uri="{BB962C8B-B14F-4D97-AF65-F5344CB8AC3E}">
-        <p14:creationId xmlns:p14="http://schemas.microsoft.com/office/powerpoint/2010/main" val="607033865"/>
+        <p14:creationId xmlns:p14="http://schemas.microsoft.com/office/powerpoint/2010/main" val="1998870921"/>
       </p:ext>
     </p:extLst>
   </p:cSld>
@@ -3289,11 +3260,11 @@
           <a:p>
             <a:r>
               <a:rPr lang="en-US" dirty="0"/>
-              <a:t>Other components</a:t>
+              <a:t>Since all engineers</a:t>
             </a:r>
             <a:r>
               <a:rPr lang="en-US" baseline="0" dirty="0"/>
-              <a:t> as hyperlinks to access</a:t>
+              <a:t> support NW and EPM add-in, then this component would be on the Home Page for the fastest accessing</a:t>
             </a:r>
             <a:endParaRPr lang="en-US" dirty="0"/>
           </a:p>
@@ -3317,7 +3288,7 @@
             <a:fld id="{7D8C2C35-2B8A-446E-BEC0-FD36716C29AC}" type="slidenum">
               <a:rPr lang="de-DE" smtClean="0"/>
               <a:pPr/>
-              <a:t>20</a:t>
+              <a:t>18</a:t>
             </a:fld>
             <a:endParaRPr lang="de-DE" dirty="0"/>
           </a:p>
@@ -3326,7 +3297,7 @@
     </p:spTree>
     <p:extLst>
       <p:ext uri="{BB962C8B-B14F-4D97-AF65-F5344CB8AC3E}">
-        <p14:creationId xmlns:p14="http://schemas.microsoft.com/office/powerpoint/2010/main" val="996789701"/>
+        <p14:creationId xmlns:p14="http://schemas.microsoft.com/office/powerpoint/2010/main" val="2051000623"/>
       </p:ext>
     </p:extLst>
   </p:cSld>
@@ -3382,11 +3353,23 @@
           <a:p>
             <a:r>
               <a:rPr lang="en-US" dirty="0"/>
-              <a:t>Return</a:t>
+              <a:t>Automatically</a:t>
             </a:r>
             <a:r>
               <a:rPr lang="en-US" baseline="0" dirty="0"/>
-              <a:t> to home page anytime</a:t>
+              <a:t> recommend the next </a:t>
+            </a:r>
+            <a:r>
+              <a:rPr lang="en-US" sz="1400" b="0" i="0" kern="1200" dirty="0">
+                <a:solidFill>
+                  <a:schemeClr val="tx1"/>
+                </a:solidFill>
+                <a:effectLst/>
+                <a:latin typeface="+mn-lt"/>
+                <a:ea typeface="+mn-ea"/>
+                <a:cs typeface="+mn-cs"/>
+              </a:rPr>
+              <a:t>candidate</a:t>
             </a:r>
             <a:endParaRPr lang="en-US" dirty="0"/>
           </a:p>
@@ -3410,7 +3393,7 @@
             <a:fld id="{7D8C2C35-2B8A-446E-BEC0-FD36716C29AC}" type="slidenum">
               <a:rPr lang="de-DE" smtClean="0"/>
               <a:pPr/>
-              <a:t>21</a:t>
+              <a:t>19</a:t>
             </a:fld>
             <a:endParaRPr lang="de-DE" dirty="0"/>
           </a:p>
@@ -3419,7 +3402,7 @@
     </p:spTree>
     <p:extLst>
       <p:ext uri="{BB962C8B-B14F-4D97-AF65-F5344CB8AC3E}">
-        <p14:creationId xmlns:p14="http://schemas.microsoft.com/office/powerpoint/2010/main" val="396846032"/>
+        <p14:creationId xmlns:p14="http://schemas.microsoft.com/office/powerpoint/2010/main" val="981962001"/>
       </p:ext>
     </p:extLst>
   </p:cSld>
@@ -3475,8 +3458,13 @@
           <a:p>
             <a:r>
               <a:rPr lang="en-US" dirty="0"/>
-              <a:t>Then bring to the next chapter</a:t>
-            </a:r>
+              <a:t>Engineer</a:t>
+            </a:r>
+            <a:r>
+              <a:rPr lang="en-US" baseline="0" dirty="0"/>
+              <a:t> will not be filtered if it is unavailable. </a:t>
+            </a:r>
+            <a:endParaRPr lang="en-US" dirty="0"/>
           </a:p>
         </p:txBody>
       </p:sp>
@@ -3498,7 +3486,7 @@
             <a:fld id="{7D8C2C35-2B8A-446E-BEC0-FD36716C29AC}" type="slidenum">
               <a:rPr lang="de-DE" smtClean="0"/>
               <a:pPr/>
-              <a:t>24</a:t>
+              <a:t>20</a:t>
             </a:fld>
             <a:endParaRPr lang="de-DE" dirty="0"/>
           </a:p>
@@ -3507,7 +3495,7 @@
     </p:spTree>
     <p:extLst>
       <p:ext uri="{BB962C8B-B14F-4D97-AF65-F5344CB8AC3E}">
-        <p14:creationId xmlns:p14="http://schemas.microsoft.com/office/powerpoint/2010/main" val="1990883211"/>
+        <p14:creationId xmlns:p14="http://schemas.microsoft.com/office/powerpoint/2010/main" val="607033865"/>
       </p:ext>
     </p:extLst>
   </p:cSld>
@@ -3536,37 +3524,6 @@
       </p:grpSpPr>
       <p:sp>
         <p:nvSpPr>
-          <p:cNvPr id="2" name="Slide Image Placeholder 1"/>
-          <p:cNvSpPr>
-            <a:spLocks noGrp="1" noRot="1" noChangeAspect="1"/>
-          </p:cNvSpPr>
-          <p:nvPr>
-            <p:ph type="sldImg"/>
-          </p:nvPr>
-        </p:nvSpPr>
-        <p:spPr/>
-      </p:sp>
-      <p:sp>
-        <p:nvSpPr>
-          <p:cNvPr id="3" name="Notes Placeholder 2"/>
-          <p:cNvSpPr>
-            <a:spLocks noGrp="1"/>
-          </p:cNvSpPr>
-          <p:nvPr>
-            <p:ph type="body" idx="1"/>
-          </p:nvPr>
-        </p:nvSpPr>
-        <p:spPr/>
-        <p:txBody>
-          <a:bodyPr/>
-          <a:lstStyle/>
-          <a:p>
-            <a:endParaRPr lang="en-US" dirty="0"/>
-          </a:p>
-        </p:txBody>
-      </p:sp>
-      <p:sp>
-        <p:nvSpPr>
           <p:cNvPr id="4" name="Slide Number Placeholder 3"/>
           <p:cNvSpPr>
             <a:spLocks noGrp="1"/>
@@ -3583,16 +3540,66 @@
             <a:fld id="{7D8C2C35-2B8A-446E-BEC0-FD36716C29AC}" type="slidenum">
               <a:rPr lang="de-DE" smtClean="0"/>
               <a:pPr/>
-              <a:t>4</a:t>
+              <a:t>2</a:t>
             </a:fld>
             <a:endParaRPr lang="de-DE" dirty="0"/>
+          </a:p>
+        </p:txBody>
+      </p:sp>
+      <p:sp>
+        <p:nvSpPr>
+          <p:cNvPr id="9" name="Slide Image Placeholder 8"/>
+          <p:cNvSpPr>
+            <a:spLocks noGrp="1" noRot="1" noChangeAspect="1"/>
+          </p:cNvSpPr>
+          <p:nvPr>
+            <p:ph type="sldImg"/>
+          </p:nvPr>
+        </p:nvSpPr>
+        <p:spPr>
+          <a:xfrm>
+            <a:off x="547688" y="612775"/>
+            <a:ext cx="5762625" cy="3241675"/>
+          </a:xfrm>
+        </p:spPr>
+      </p:sp>
+      <p:sp>
+        <p:nvSpPr>
+          <p:cNvPr id="10" name="Notes Placeholder 9"/>
+          <p:cNvSpPr>
+            <a:spLocks noGrp="1"/>
+          </p:cNvSpPr>
+          <p:nvPr>
+            <p:ph type="body" idx="1"/>
+          </p:nvPr>
+        </p:nvSpPr>
+        <p:spPr/>
+        <p:txBody>
+          <a:bodyPr>
+            <a:normAutofit/>
+          </a:bodyPr>
+          <a:lstStyle/>
+          <a:p>
+            <a:r>
+              <a:rPr lang="en-CA" dirty="0"/>
+              <a:t>Today's agenda: first I would like to explain the reason why I </a:t>
+            </a:r>
+            <a:r>
+              <a:rPr lang="en-CA" dirty="0" err="1"/>
+              <a:t>ceated</a:t>
+            </a:r>
+            <a:r>
+              <a:rPr lang="en-CA" dirty="0"/>
+              <a:t> this app. Second I will show you a short real-time demo. Thirdly, I will summary the benefits you will gain from this app. Last but not least, it is welcome to express any suggestions and questions.</a:t>
+            </a:r>
+            <a:endParaRPr lang="en-US" dirty="0"/>
           </a:p>
         </p:txBody>
       </p:sp>
     </p:spTree>
     <p:extLst>
       <p:ext uri="{BB962C8B-B14F-4D97-AF65-F5344CB8AC3E}">
-        <p14:creationId xmlns:p14="http://schemas.microsoft.com/office/powerpoint/2010/main" val="1532547752"/>
+        <p14:creationId xmlns:p14="http://schemas.microsoft.com/office/powerpoint/2010/main" val="979621955"/>
       </p:ext>
     </p:extLst>
   </p:cSld>
@@ -3621,6 +3628,45 @@
       </p:grpSpPr>
       <p:sp>
         <p:nvSpPr>
+          <p:cNvPr id="2" name="Slide Image Placeholder 1"/>
+          <p:cNvSpPr>
+            <a:spLocks noGrp="1" noRot="1" noChangeAspect="1"/>
+          </p:cNvSpPr>
+          <p:nvPr>
+            <p:ph type="sldImg"/>
+          </p:nvPr>
+        </p:nvSpPr>
+        <p:spPr/>
+      </p:sp>
+      <p:sp>
+        <p:nvSpPr>
+          <p:cNvPr id="3" name="Notes Placeholder 2"/>
+          <p:cNvSpPr>
+            <a:spLocks noGrp="1"/>
+          </p:cNvSpPr>
+          <p:nvPr>
+            <p:ph type="body" idx="1"/>
+          </p:nvPr>
+        </p:nvSpPr>
+        <p:spPr/>
+        <p:txBody>
+          <a:bodyPr/>
+          <a:lstStyle/>
+          <a:p>
+            <a:r>
+              <a:rPr lang="en-US" dirty="0"/>
+              <a:t>Other components</a:t>
+            </a:r>
+            <a:r>
+              <a:rPr lang="en-US" baseline="0" dirty="0"/>
+              <a:t> as hyperlinks to access</a:t>
+            </a:r>
+            <a:endParaRPr lang="en-US" dirty="0"/>
+          </a:p>
+        </p:txBody>
+      </p:sp>
+      <p:sp>
+        <p:nvSpPr>
           <p:cNvPr id="4" name="Slide Number Placeholder 3"/>
           <p:cNvSpPr>
             <a:spLocks noGrp="1"/>
@@ -3637,7 +3683,242 @@
             <a:fld id="{7D8C2C35-2B8A-446E-BEC0-FD36716C29AC}" type="slidenum">
               <a:rPr lang="de-DE" smtClean="0"/>
               <a:pPr/>
-              <a:t>28</a:t>
+              <a:t>21</a:t>
+            </a:fld>
+            <a:endParaRPr lang="de-DE" dirty="0"/>
+          </a:p>
+        </p:txBody>
+      </p:sp>
+    </p:spTree>
+    <p:extLst>
+      <p:ext uri="{BB962C8B-B14F-4D97-AF65-F5344CB8AC3E}">
+        <p14:creationId xmlns:p14="http://schemas.microsoft.com/office/powerpoint/2010/main" val="996789701"/>
+      </p:ext>
+    </p:extLst>
+  </p:cSld>
+  <p:clrMapOvr>
+    <a:masterClrMapping/>
+  </p:clrMapOvr>
+</p:notes>
+</file>
+
+<file path=ppt/notesSlides/notesSlide21.xml><?xml version="1.0" encoding="utf-8"?>
+<p:notes xmlns:a="http://schemas.openxmlformats.org/drawingml/2006/main" xmlns:r="http://schemas.openxmlformats.org/officeDocument/2006/relationships" xmlns:p="http://schemas.openxmlformats.org/presentationml/2006/main">
+  <p:cSld>
+    <p:spTree>
+      <p:nvGrpSpPr>
+        <p:cNvPr id="1" name=""/>
+        <p:cNvGrpSpPr/>
+        <p:nvPr/>
+      </p:nvGrpSpPr>
+      <p:grpSpPr>
+        <a:xfrm>
+          <a:off x="0" y="0"/>
+          <a:ext cx="0" cy="0"/>
+          <a:chOff x="0" y="0"/>
+          <a:chExt cx="0" cy="0"/>
+        </a:xfrm>
+      </p:grpSpPr>
+      <p:sp>
+        <p:nvSpPr>
+          <p:cNvPr id="2" name="Slide Image Placeholder 1"/>
+          <p:cNvSpPr>
+            <a:spLocks noGrp="1" noRot="1" noChangeAspect="1"/>
+          </p:cNvSpPr>
+          <p:nvPr>
+            <p:ph type="sldImg"/>
+          </p:nvPr>
+        </p:nvSpPr>
+        <p:spPr/>
+      </p:sp>
+      <p:sp>
+        <p:nvSpPr>
+          <p:cNvPr id="3" name="Notes Placeholder 2"/>
+          <p:cNvSpPr>
+            <a:spLocks noGrp="1"/>
+          </p:cNvSpPr>
+          <p:nvPr>
+            <p:ph type="body" idx="1"/>
+          </p:nvPr>
+        </p:nvSpPr>
+        <p:spPr/>
+        <p:txBody>
+          <a:bodyPr/>
+          <a:lstStyle/>
+          <a:p>
+            <a:r>
+              <a:rPr lang="en-US" dirty="0"/>
+              <a:t>Return</a:t>
+            </a:r>
+            <a:r>
+              <a:rPr lang="en-US" baseline="0" dirty="0"/>
+              <a:t> to home page anytime</a:t>
+            </a:r>
+            <a:endParaRPr lang="en-US" dirty="0"/>
+          </a:p>
+        </p:txBody>
+      </p:sp>
+      <p:sp>
+        <p:nvSpPr>
+          <p:cNvPr id="4" name="Slide Number Placeholder 3"/>
+          <p:cNvSpPr>
+            <a:spLocks noGrp="1"/>
+          </p:cNvSpPr>
+          <p:nvPr>
+            <p:ph type="sldNum" sz="quarter" idx="10"/>
+          </p:nvPr>
+        </p:nvSpPr>
+        <p:spPr/>
+        <p:txBody>
+          <a:bodyPr/>
+          <a:lstStyle/>
+          <a:p>
+            <a:fld id="{7D8C2C35-2B8A-446E-BEC0-FD36716C29AC}" type="slidenum">
+              <a:rPr lang="de-DE" smtClean="0"/>
+              <a:pPr/>
+              <a:t>22</a:t>
+            </a:fld>
+            <a:endParaRPr lang="de-DE" dirty="0"/>
+          </a:p>
+        </p:txBody>
+      </p:sp>
+    </p:spTree>
+    <p:extLst>
+      <p:ext uri="{BB962C8B-B14F-4D97-AF65-F5344CB8AC3E}">
+        <p14:creationId xmlns:p14="http://schemas.microsoft.com/office/powerpoint/2010/main" val="396846032"/>
+      </p:ext>
+    </p:extLst>
+  </p:cSld>
+  <p:clrMapOvr>
+    <a:masterClrMapping/>
+  </p:clrMapOvr>
+</p:notes>
+</file>
+
+<file path=ppt/notesSlides/notesSlide22.xml><?xml version="1.0" encoding="utf-8"?>
+<p:notes xmlns:a="http://schemas.openxmlformats.org/drawingml/2006/main" xmlns:r="http://schemas.openxmlformats.org/officeDocument/2006/relationships" xmlns:p="http://schemas.openxmlformats.org/presentationml/2006/main">
+  <p:cSld>
+    <p:spTree>
+      <p:nvGrpSpPr>
+        <p:cNvPr id="1" name=""/>
+        <p:cNvGrpSpPr/>
+        <p:nvPr/>
+      </p:nvGrpSpPr>
+      <p:grpSpPr>
+        <a:xfrm>
+          <a:off x="0" y="0"/>
+          <a:ext cx="0" cy="0"/>
+          <a:chOff x="0" y="0"/>
+          <a:chExt cx="0" cy="0"/>
+        </a:xfrm>
+      </p:grpSpPr>
+      <p:sp>
+        <p:nvSpPr>
+          <p:cNvPr id="2" name="Slide Image Placeholder 1"/>
+          <p:cNvSpPr>
+            <a:spLocks noGrp="1" noRot="1" noChangeAspect="1"/>
+          </p:cNvSpPr>
+          <p:nvPr>
+            <p:ph type="sldImg"/>
+          </p:nvPr>
+        </p:nvSpPr>
+        <p:spPr/>
+      </p:sp>
+      <p:sp>
+        <p:nvSpPr>
+          <p:cNvPr id="3" name="Notes Placeholder 2"/>
+          <p:cNvSpPr>
+            <a:spLocks noGrp="1"/>
+          </p:cNvSpPr>
+          <p:nvPr>
+            <p:ph type="body" idx="1"/>
+          </p:nvPr>
+        </p:nvSpPr>
+        <p:spPr/>
+        <p:txBody>
+          <a:bodyPr/>
+          <a:lstStyle/>
+          <a:p>
+            <a:r>
+              <a:rPr lang="en-US" dirty="0"/>
+              <a:t>Then bring to the next chapter</a:t>
+            </a:r>
+          </a:p>
+        </p:txBody>
+      </p:sp>
+      <p:sp>
+        <p:nvSpPr>
+          <p:cNvPr id="4" name="Slide Number Placeholder 3"/>
+          <p:cNvSpPr>
+            <a:spLocks noGrp="1"/>
+          </p:cNvSpPr>
+          <p:nvPr>
+            <p:ph type="sldNum" sz="quarter" idx="10"/>
+          </p:nvPr>
+        </p:nvSpPr>
+        <p:spPr/>
+        <p:txBody>
+          <a:bodyPr/>
+          <a:lstStyle/>
+          <a:p>
+            <a:fld id="{7D8C2C35-2B8A-446E-BEC0-FD36716C29AC}" type="slidenum">
+              <a:rPr lang="de-DE" smtClean="0"/>
+              <a:pPr/>
+              <a:t>25</a:t>
+            </a:fld>
+            <a:endParaRPr lang="de-DE" dirty="0"/>
+          </a:p>
+        </p:txBody>
+      </p:sp>
+    </p:spTree>
+    <p:extLst>
+      <p:ext uri="{BB962C8B-B14F-4D97-AF65-F5344CB8AC3E}">
+        <p14:creationId xmlns:p14="http://schemas.microsoft.com/office/powerpoint/2010/main" val="1990883211"/>
+      </p:ext>
+    </p:extLst>
+  </p:cSld>
+  <p:clrMapOvr>
+    <a:masterClrMapping/>
+  </p:clrMapOvr>
+</p:notes>
+</file>
+
+<file path=ppt/notesSlides/notesSlide23.xml><?xml version="1.0" encoding="utf-8"?>
+<p:notes xmlns:a="http://schemas.openxmlformats.org/drawingml/2006/main" xmlns:r="http://schemas.openxmlformats.org/officeDocument/2006/relationships" xmlns:p="http://schemas.openxmlformats.org/presentationml/2006/main">
+  <p:cSld>
+    <p:spTree>
+      <p:nvGrpSpPr>
+        <p:cNvPr id="1" name=""/>
+        <p:cNvGrpSpPr/>
+        <p:nvPr/>
+      </p:nvGrpSpPr>
+      <p:grpSpPr>
+        <a:xfrm>
+          <a:off x="0" y="0"/>
+          <a:ext cx="0" cy="0"/>
+          <a:chOff x="0" y="0"/>
+          <a:chExt cx="0" cy="0"/>
+        </a:xfrm>
+      </p:grpSpPr>
+      <p:sp>
+        <p:nvSpPr>
+          <p:cNvPr id="4" name="Slide Number Placeholder 3"/>
+          <p:cNvSpPr>
+            <a:spLocks noGrp="1"/>
+          </p:cNvSpPr>
+          <p:nvPr>
+            <p:ph type="sldNum" sz="quarter" idx="10"/>
+          </p:nvPr>
+        </p:nvSpPr>
+        <p:spPr/>
+        <p:txBody>
+          <a:bodyPr/>
+          <a:lstStyle/>
+          <a:p>
+            <a:fld id="{7D8C2C35-2B8A-446E-BEC0-FD36716C29AC}" type="slidenum">
+              <a:rPr lang="de-DE" smtClean="0"/>
+              <a:pPr/>
+              <a:t>29</a:t>
             </a:fld>
             <a:endParaRPr lang="de-DE" dirty="0"/>
           </a:p>
@@ -3739,24 +4020,8 @@
           <a:lstStyle/>
           <a:p>
             <a:r>
-              <a:rPr lang="zh-CN" altLang="en-US" dirty="0"/>
-              <a:t>为了解决以上问题，派生出</a:t>
-            </a:r>
-            <a:r>
-              <a:rPr lang="en-US" altLang="zh-CN" dirty="0" err="1"/>
-              <a:t>Qmweb</a:t>
-            </a:r>
-            <a:r>
-              <a:rPr lang="zh-CN" altLang="en-US" dirty="0"/>
-              <a:t>。然后采访和思考了多种方式去形成</a:t>
-            </a:r>
-            <a:r>
-              <a:rPr lang="en-US" altLang="zh-CN" dirty="0" err="1"/>
-              <a:t>qm</a:t>
-            </a:r>
-            <a:r>
-              <a:rPr lang="zh-CN" altLang="en-US" dirty="0"/>
-              <a:t>到底为何样式</a:t>
+              <a:rPr lang="en-CA" dirty="0"/>
+              <a:t>First, why I created this app</a:t>
             </a:r>
             <a:endParaRPr lang="en-US" dirty="0"/>
           </a:p>
@@ -3780,7 +4045,7 @@
             <a:fld id="{7D8C2C35-2B8A-446E-BEC0-FD36716C29AC}" type="slidenum">
               <a:rPr lang="de-DE" smtClean="0"/>
               <a:pPr/>
-              <a:t>5</a:t>
+              <a:t>3</a:t>
             </a:fld>
             <a:endParaRPr lang="de-DE" dirty="0"/>
           </a:p>
@@ -3789,7 +4054,7 @@
     </p:spTree>
     <p:extLst>
       <p:ext uri="{BB962C8B-B14F-4D97-AF65-F5344CB8AC3E}">
-        <p14:creationId xmlns:p14="http://schemas.microsoft.com/office/powerpoint/2010/main" val="2754140105"/>
+        <p14:creationId xmlns:p14="http://schemas.microsoft.com/office/powerpoint/2010/main" val="2631448463"/>
       </p:ext>
     </p:extLst>
   </p:cSld>
@@ -3844,8 +4109,8 @@
           <a:lstStyle/>
           <a:p>
             <a:r>
-              <a:rPr lang="zh-CN" altLang="en-US" dirty="0"/>
-              <a:t>采访中得知，目前为止有一些存在的工具</a:t>
+              <a:rPr lang="en-CA" dirty="0"/>
+              <a:t>Some issue and discussion were generated since the new QM processing deployed. Shortly, four parts. Engineers want to distribute incidents equally. Engineers want to pull tickets directly. Queue manager is different to process and handle multi-side requests. And other. </a:t>
             </a:r>
             <a:endParaRPr lang="en-US" dirty="0"/>
           </a:p>
@@ -3869,7 +4134,7 @@
             <a:fld id="{7D8C2C35-2B8A-446E-BEC0-FD36716C29AC}" type="slidenum">
               <a:rPr lang="de-DE" smtClean="0"/>
               <a:pPr/>
-              <a:t>6</a:t>
+              <a:t>4</a:t>
             </a:fld>
             <a:endParaRPr lang="de-DE" dirty="0"/>
           </a:p>
@@ -3878,7 +4143,7 @@
     </p:spTree>
     <p:extLst>
       <p:ext uri="{BB962C8B-B14F-4D97-AF65-F5344CB8AC3E}">
-        <p14:creationId xmlns:p14="http://schemas.microsoft.com/office/powerpoint/2010/main" val="2911201441"/>
+        <p14:creationId xmlns:p14="http://schemas.microsoft.com/office/powerpoint/2010/main" val="1532547752"/>
       </p:ext>
     </p:extLst>
   </p:cSld>
@@ -3933,9 +4198,33 @@
           <a:lstStyle/>
           <a:p>
             <a:r>
-              <a:rPr lang="en-US" dirty="0"/>
-              <a:t>Look at these color! Not want to use it!  But it only supports team that has a single component. But good for our team that per person has multiple components.</a:t>
-            </a:r>
+              <a:rPr lang="zh-CN" altLang="en-US" dirty="0"/>
+              <a:t>为了解决以上问题，派生出</a:t>
+            </a:r>
+            <a:r>
+              <a:rPr lang="en-US" altLang="zh-CN" dirty="0" err="1"/>
+              <a:t>Qmweb</a:t>
+            </a:r>
+            <a:r>
+              <a:rPr lang="zh-CN" altLang="en-US" dirty="0"/>
+              <a:t>。然后采访和思考了多种方式去形成</a:t>
+            </a:r>
+            <a:r>
+              <a:rPr lang="en-US" altLang="zh-CN" dirty="0" err="1"/>
+              <a:t>qm</a:t>
+            </a:r>
+            <a:r>
+              <a:rPr lang="zh-CN" altLang="en-US" dirty="0"/>
+              <a:t>到底为何样式</a:t>
+            </a:r>
+            <a:endParaRPr lang="en-CA" altLang="zh-CN" dirty="0"/>
+          </a:p>
+          <a:p>
+            <a:r>
+              <a:rPr lang="en-CA" dirty="0"/>
+              <a:t>It is better to have a document and application that can handle these issue for us. But is there any existed application that satisfy our requirements?</a:t>
+            </a:r>
+            <a:endParaRPr lang="en-US" dirty="0"/>
           </a:p>
         </p:txBody>
       </p:sp>
@@ -3957,7 +4246,7 @@
             <a:fld id="{7D8C2C35-2B8A-446E-BEC0-FD36716C29AC}" type="slidenum">
               <a:rPr lang="de-DE" smtClean="0"/>
               <a:pPr/>
-              <a:t>7</a:t>
+              <a:t>5</a:t>
             </a:fld>
             <a:endParaRPr lang="de-DE" dirty="0"/>
           </a:p>
@@ -3966,7 +4255,7 @@
     </p:spTree>
     <p:extLst>
       <p:ext uri="{BB962C8B-B14F-4D97-AF65-F5344CB8AC3E}">
-        <p14:creationId xmlns:p14="http://schemas.microsoft.com/office/powerpoint/2010/main" val="3950872288"/>
+        <p14:creationId xmlns:p14="http://schemas.microsoft.com/office/powerpoint/2010/main" val="2754140105"/>
       </p:ext>
     </p:extLst>
   </p:cSld>
@@ -4021,9 +4310,10 @@
           <a:lstStyle/>
           <a:p>
             <a:r>
-              <a:rPr lang="en-US" dirty="0"/>
-              <a:t>Not easy to know what can we use it for?</a:t>
-            </a:r>
+              <a:rPr lang="en-CA" dirty="0"/>
+              <a:t>It is better to have a document and application that can handle these issue for us. But is there any existed application that satisfy our requirements?</a:t>
+            </a:r>
+            <a:endParaRPr lang="en-US" dirty="0"/>
           </a:p>
         </p:txBody>
       </p:sp>
@@ -4045,7 +4335,7 @@
             <a:fld id="{7D8C2C35-2B8A-446E-BEC0-FD36716C29AC}" type="slidenum">
               <a:rPr lang="de-DE" smtClean="0"/>
               <a:pPr/>
-              <a:t>8</a:t>
+              <a:t>6</a:t>
             </a:fld>
             <a:endParaRPr lang="de-DE" dirty="0"/>
           </a:p>
@@ -4054,7 +4344,7 @@
     </p:spTree>
     <p:extLst>
       <p:ext uri="{BB962C8B-B14F-4D97-AF65-F5344CB8AC3E}">
-        <p14:creationId xmlns:p14="http://schemas.microsoft.com/office/powerpoint/2010/main" val="1727069759"/>
+        <p14:creationId xmlns:p14="http://schemas.microsoft.com/office/powerpoint/2010/main" val="880562353"/>
       </p:ext>
     </p:extLst>
   </p:cSld>
@@ -4109,9 +4399,17 @@
           <a:lstStyle/>
           <a:p>
             <a:r>
-              <a:rPr lang="en-US" dirty="0"/>
-              <a:t>Not support new features naturally</a:t>
-            </a:r>
+              <a:rPr lang="zh-CN" altLang="en-US" dirty="0"/>
+              <a:t>采访中得知，目前为止有一些存在的工具</a:t>
+            </a:r>
+            <a:endParaRPr lang="en-CA" altLang="zh-CN" dirty="0"/>
+          </a:p>
+          <a:p>
+            <a:r>
+              <a:rPr lang="en-CA" dirty="0"/>
+              <a:t>According to my investigation, there are some existed tools. The first one is Workload Analyzer, another Java tool. So many engineers knew it was horrible</a:t>
+            </a:r>
+            <a:endParaRPr lang="en-US" dirty="0"/>
           </a:p>
         </p:txBody>
       </p:sp>
@@ -4133,7 +4431,7 @@
             <a:fld id="{7D8C2C35-2B8A-446E-BEC0-FD36716C29AC}" type="slidenum">
               <a:rPr lang="de-DE" smtClean="0"/>
               <a:pPr/>
-              <a:t>9</a:t>
+              <a:t>7</a:t>
             </a:fld>
             <a:endParaRPr lang="de-DE" dirty="0"/>
           </a:p>
@@ -4142,7 +4440,7 @@
     </p:spTree>
     <p:extLst>
       <p:ext uri="{BB962C8B-B14F-4D97-AF65-F5344CB8AC3E}">
-        <p14:creationId xmlns:p14="http://schemas.microsoft.com/office/powerpoint/2010/main" val="2773265381"/>
+        <p14:creationId xmlns:p14="http://schemas.microsoft.com/office/powerpoint/2010/main" val="2911201441"/>
       </p:ext>
     </p:extLst>
   </p:cSld>
@@ -4197,12 +4495,8 @@
           <a:lstStyle/>
           <a:p>
             <a:r>
-              <a:rPr lang="en-US" altLang="zh-CN" dirty="0"/>
-              <a:t>Distributed </a:t>
-            </a:r>
-            <a:r>
               <a:rPr lang="en-US" dirty="0"/>
-              <a:t>Numbers, numbers, numbers!</a:t>
+              <a:t>SAP Product Support Dispatcher. Look at these color. I don’t want to use it if I have choose.  In addition, it only supports team that has a single component. Not good for our team since our engineers have multiple components.</a:t>
             </a:r>
           </a:p>
         </p:txBody>
@@ -4225,7 +4519,7 @@
             <a:fld id="{7D8C2C35-2B8A-446E-BEC0-FD36716C29AC}" type="slidenum">
               <a:rPr lang="de-DE" smtClean="0"/>
               <a:pPr/>
-              <a:t>10</a:t>
+              <a:t>8</a:t>
             </a:fld>
             <a:endParaRPr lang="de-DE" dirty="0"/>
           </a:p>
@@ -4234,7 +4528,7 @@
     </p:spTree>
     <p:extLst>
       <p:ext uri="{BB962C8B-B14F-4D97-AF65-F5344CB8AC3E}">
-        <p14:creationId xmlns:p14="http://schemas.microsoft.com/office/powerpoint/2010/main" val="395136101"/>
+        <p14:creationId xmlns:p14="http://schemas.microsoft.com/office/powerpoint/2010/main" val="3950872288"/>
       </p:ext>
     </p:extLst>
   </p:cSld>
@@ -4289,14 +4583,13 @@
           <a:lstStyle/>
           <a:p>
             <a:r>
+              <a:rPr lang="en-US" dirty="0" err="1"/>
+              <a:t>QMDock</a:t>
+            </a:r>
+            <a:r>
               <a:rPr lang="en-US" dirty="0"/>
-              <a:t>Forgot to handover, trouble</a:t>
-            </a:r>
-            <a:r>
-              <a:rPr lang="en-US" baseline="0" dirty="0"/>
-              <a:t> maker</a:t>
-            </a:r>
-            <a:endParaRPr lang="en-US" dirty="0"/>
+              <a:t>. Not easy to know what can we use it for? And, supper unstable even I downloaded the latest version</a:t>
+            </a:r>
           </a:p>
         </p:txBody>
       </p:sp>
@@ -4318,7 +4611,7 @@
             <a:fld id="{7D8C2C35-2B8A-446E-BEC0-FD36716C29AC}" type="slidenum">
               <a:rPr lang="de-DE" smtClean="0"/>
               <a:pPr/>
-              <a:t>11</a:t>
+              <a:t>9</a:t>
             </a:fld>
             <a:endParaRPr lang="de-DE" dirty="0"/>
           </a:p>
@@ -4327,7 +4620,7 @@
     </p:spTree>
     <p:extLst>
       <p:ext uri="{BB962C8B-B14F-4D97-AF65-F5344CB8AC3E}">
-        <p14:creationId xmlns:p14="http://schemas.microsoft.com/office/powerpoint/2010/main" val="1396010178"/>
+        <p14:creationId xmlns:p14="http://schemas.microsoft.com/office/powerpoint/2010/main" val="1727069759"/>
       </p:ext>
     </p:extLst>
   </p:cSld>
@@ -11944,7 +12237,7 @@
           </p:nvPr>
         </p:nvPicPr>
         <p:blipFill>
-          <a:blip r:embed="rId2"/>
+          <a:blip r:embed="rId3"/>
           <a:srcRect t="16" b="16"/>
           <a:stretch>
             <a:fillRect/>
@@ -12010,6 +12303,208 @@
           </a:p>
         </p:txBody>
       </p:sp>
+      <p:pic>
+        <p:nvPicPr>
+          <p:cNvPr id="4" name="Picture 3">
+            <a:extLst>
+              <a:ext uri="{FF2B5EF4-FFF2-40B4-BE49-F238E27FC236}">
+                <a16:creationId xmlns:a16="http://schemas.microsoft.com/office/drawing/2014/main" id="{9DB90B46-C423-4A78-B4A8-6C46B0EDC598}"/>
+              </a:ext>
+            </a:extLst>
+          </p:cNvPr>
+          <p:cNvPicPr>
+            <a:picLocks noChangeAspect="1"/>
+          </p:cNvPicPr>
+          <p:nvPr/>
+        </p:nvPicPr>
+        <p:blipFill>
+          <a:blip r:embed="rId3"/>
+          <a:stretch>
+            <a:fillRect/>
+          </a:stretch>
+        </p:blipFill>
+        <p:spPr>
+          <a:xfrm>
+            <a:off x="504001" y="1536970"/>
+            <a:ext cx="8183010" cy="5972784"/>
+          </a:xfrm>
+          <a:prstGeom prst="rect">
+            <a:avLst/>
+          </a:prstGeom>
+        </p:spPr>
+      </p:pic>
+      <p:sp>
+        <p:nvSpPr>
+          <p:cNvPr id="5" name="TextBox 4">
+            <a:extLst>
+              <a:ext uri="{FF2B5EF4-FFF2-40B4-BE49-F238E27FC236}">
+                <a16:creationId xmlns:a16="http://schemas.microsoft.com/office/drawing/2014/main" id="{72F386AC-50B1-4D5A-9969-D8C60966F904}"/>
+              </a:ext>
+            </a:extLst>
+          </p:cNvPr>
+          <p:cNvSpPr txBox="1"/>
+          <p:nvPr/>
+        </p:nvSpPr>
+        <p:spPr>
+          <a:xfrm>
+            <a:off x="5825529" y="951156"/>
+            <a:ext cx="543418" cy="307777"/>
+          </a:xfrm>
+          <a:prstGeom prst="rect">
+            <a:avLst/>
+          </a:prstGeom>
+          <a:noFill/>
+        </p:spPr>
+        <p:txBody>
+          <a:bodyPr wrap="none" lIns="0" tIns="0" rIns="0" bIns="0" rtlCol="0">
+            <a:spAutoFit/>
+          </a:bodyPr>
+          <a:lstStyle/>
+          <a:p>
+            <a:pPr fontAlgn="base">
+              <a:spcBef>
+                <a:spcPct val="50000"/>
+              </a:spcBef>
+              <a:spcAft>
+                <a:spcPct val="0"/>
+              </a:spcAft>
+              <a:buClr>
+                <a:srgbClr val="F0AB00"/>
+              </a:buClr>
+              <a:buSzPct val="80000"/>
+            </a:pPr>
+            <a:r>
+              <a:rPr lang="en-US" sz="2000" b="1" kern="0" dirty="0">
+                <a:ea typeface="Arial Unicode MS" pitchFamily="34" charset="-128"/>
+                <a:cs typeface="Arial Unicode MS" pitchFamily="34" charset="-128"/>
+              </a:rPr>
+              <a:t>BCP</a:t>
+            </a:r>
+          </a:p>
+        </p:txBody>
+      </p:sp>
+      <p:sp>
+        <p:nvSpPr>
+          <p:cNvPr id="6" name="TextBox 5">
+            <a:extLst>
+              <a:ext uri="{FF2B5EF4-FFF2-40B4-BE49-F238E27FC236}">
+                <a16:creationId xmlns:a16="http://schemas.microsoft.com/office/drawing/2014/main" id="{4A67CE65-E814-4D22-BB4C-1677A8B052B4}"/>
+              </a:ext>
+            </a:extLst>
+          </p:cNvPr>
+          <p:cNvSpPr txBox="1"/>
+          <p:nvPr/>
+        </p:nvSpPr>
+        <p:spPr>
+          <a:xfrm>
+            <a:off x="9260731" y="3414409"/>
+            <a:ext cx="2136803" cy="369332"/>
+          </a:xfrm>
+          <a:prstGeom prst="rect">
+            <a:avLst/>
+          </a:prstGeom>
+          <a:noFill/>
+        </p:spPr>
+        <p:txBody>
+          <a:bodyPr wrap="none" lIns="0" tIns="0" rIns="0" bIns="0" rtlCol="0">
+            <a:spAutoFit/>
+          </a:bodyPr>
+          <a:lstStyle/>
+          <a:p>
+            <a:pPr fontAlgn="base">
+              <a:spcBef>
+                <a:spcPct val="50000"/>
+              </a:spcBef>
+              <a:spcAft>
+                <a:spcPct val="0"/>
+              </a:spcAft>
+              <a:buClr>
+                <a:srgbClr val="F0AB00"/>
+              </a:buClr>
+              <a:buSzPct val="80000"/>
+            </a:pPr>
+            <a:r>
+              <a:rPr lang="en-US" sz="2400" kern="0" dirty="0">
+                <a:ea typeface="Arial Unicode MS" pitchFamily="34" charset="-128"/>
+                <a:cs typeface="Arial Unicode MS" pitchFamily="34" charset="-128"/>
+              </a:rPr>
+              <a:t>Cannot </a:t>
+            </a:r>
+            <a:r>
+              <a:rPr lang="en-US" sz="2400" b="1" kern="0" dirty="0">
+                <a:ea typeface="Arial Unicode MS" pitchFamily="34" charset="-128"/>
+                <a:cs typeface="Arial Unicode MS" pitchFamily="34" charset="-128"/>
+              </a:rPr>
+              <a:t>Count</a:t>
+            </a:r>
+            <a:r>
+              <a:rPr lang="en-US" sz="2400" kern="0" dirty="0">
+                <a:ea typeface="Arial Unicode MS" pitchFamily="34" charset="-128"/>
+                <a:cs typeface="Arial Unicode MS" pitchFamily="34" charset="-128"/>
+              </a:rPr>
+              <a:t>! </a:t>
+            </a:r>
+          </a:p>
+        </p:txBody>
+      </p:sp>
+    </p:spTree>
+    <p:extLst>
+      <p:ext uri="{BB962C8B-B14F-4D97-AF65-F5344CB8AC3E}">
+        <p14:creationId xmlns:p14="http://schemas.microsoft.com/office/powerpoint/2010/main" val="1387238931"/>
+      </p:ext>
+    </p:extLst>
+  </p:cSld>
+  <p:clrMapOvr>
+    <a:masterClrMapping/>
+  </p:clrMapOvr>
+</p:sld>
+</file>
+
+<file path=ppt/slides/slide11.xml><?xml version="1.0" encoding="utf-8"?>
+<p:sld xmlns:a="http://schemas.openxmlformats.org/drawingml/2006/main" xmlns:r="http://schemas.openxmlformats.org/officeDocument/2006/relationships" xmlns:p="http://schemas.openxmlformats.org/presentationml/2006/main">
+  <p:cSld>
+    <p:spTree>
+      <p:nvGrpSpPr>
+        <p:cNvPr id="1" name=""/>
+        <p:cNvGrpSpPr/>
+        <p:nvPr/>
+      </p:nvGrpSpPr>
+      <p:grpSpPr>
+        <a:xfrm>
+          <a:off x="0" y="0"/>
+          <a:ext cx="0" cy="0"/>
+          <a:chOff x="0" y="0"/>
+          <a:chExt cx="0" cy="0"/>
+        </a:xfrm>
+      </p:grpSpPr>
+      <p:sp>
+        <p:nvSpPr>
+          <p:cNvPr id="3" name="Title 2">
+            <a:extLst>
+              <a:ext uri="{FF2B5EF4-FFF2-40B4-BE49-F238E27FC236}">
+                <a16:creationId xmlns:a16="http://schemas.microsoft.com/office/drawing/2014/main" id="{59D512E6-AC34-4273-A4E1-9E3561AEDEC1}"/>
+              </a:ext>
+            </a:extLst>
+          </p:cNvPr>
+          <p:cNvSpPr>
+            <a:spLocks noGrp="1"/>
+          </p:cNvSpPr>
+          <p:nvPr>
+            <p:ph type="title"/>
+          </p:nvPr>
+        </p:nvSpPr>
+        <p:spPr/>
+        <p:txBody>
+          <a:bodyPr/>
+          <a:lstStyle/>
+          <a:p>
+            <a:r>
+              <a:rPr lang="en-US" dirty="0"/>
+              <a:t>There are some…</a:t>
+            </a:r>
+          </a:p>
+        </p:txBody>
+      </p:sp>
       <p:sp>
         <p:nvSpPr>
           <p:cNvPr id="5" name="TextBox 4">
@@ -12440,7 +12935,7 @@
 </p:sld>
 </file>
 
-<file path=ppt/slides/slide11.xml><?xml version="1.0" encoding="utf-8"?>
+<file path=ppt/slides/slide12.xml><?xml version="1.0" encoding="utf-8"?>
 <p:sld xmlns:a="http://schemas.openxmlformats.org/drawingml/2006/main" xmlns:r="http://schemas.openxmlformats.org/officeDocument/2006/relationships" xmlns:p="http://schemas.openxmlformats.org/presentationml/2006/main">
   <p:cSld>
     <p:spTree>
@@ -12529,8 +13024,38 @@
         </p:blipFill>
         <p:spPr>
           <a:xfrm>
-            <a:off x="1219200" y="1599401"/>
-            <a:ext cx="10058400" cy="3863008"/>
+            <a:off x="361459" y="1741251"/>
+            <a:ext cx="7358820" cy="2826213"/>
+          </a:xfrm>
+          <a:prstGeom prst="rect">
+            <a:avLst/>
+          </a:prstGeom>
+        </p:spPr>
+      </p:pic>
+      <p:pic>
+        <p:nvPicPr>
+          <p:cNvPr id="3" name="Picture 2">
+            <a:extLst>
+              <a:ext uri="{FF2B5EF4-FFF2-40B4-BE49-F238E27FC236}">
+                <a16:creationId xmlns:a16="http://schemas.microsoft.com/office/drawing/2014/main" id="{8A39FEC7-8728-4A94-A3BD-60EE196D69C1}"/>
+              </a:ext>
+            </a:extLst>
+          </p:cNvPr>
+          <p:cNvPicPr>
+            <a:picLocks noChangeAspect="1"/>
+          </p:cNvPicPr>
+          <p:nvPr/>
+        </p:nvPicPr>
+        <p:blipFill>
+          <a:blip r:embed="rId4"/>
+          <a:stretch>
+            <a:fillRect/>
+          </a:stretch>
+        </p:blipFill>
+        <p:spPr>
+          <a:xfrm>
+            <a:off x="4677651" y="3356042"/>
+            <a:ext cx="8466916" cy="3309228"/>
           </a:xfrm>
           <a:prstGeom prst="rect">
             <a:avLst/>
@@ -12550,7 +13075,7 @@
 </p:sld>
 </file>
 
-<file path=ppt/slides/slide12.xml><?xml version="1.0" encoding="utf-8"?>
+<file path=ppt/slides/slide13.xml><?xml version="1.0" encoding="utf-8"?>
 <p:sld xmlns:a="http://schemas.openxmlformats.org/drawingml/2006/main" xmlns:r="http://schemas.openxmlformats.org/officeDocument/2006/relationships" xmlns:p="http://schemas.openxmlformats.org/presentationml/2006/main">
   <p:cSld>
     <p:spTree>
@@ -12762,7 +13287,7 @@
 </p:sld>
 </file>
 
-<file path=ppt/slides/slide13.xml><?xml version="1.0" encoding="utf-8"?>
+<file path=ppt/slides/slide14.xml><?xml version="1.0" encoding="utf-8"?>
 <p:sld xmlns:a="http://schemas.openxmlformats.org/drawingml/2006/main" xmlns:r="http://schemas.openxmlformats.org/officeDocument/2006/relationships" xmlns:p="http://schemas.openxmlformats.org/presentationml/2006/main">
   <p:cSld>
     <p:spTree>
@@ -13412,7 +13937,7 @@
 </p:sld>
 </file>
 
-<file path=ppt/slides/slide14.xml><?xml version="1.0" encoding="utf-8"?>
+<file path=ppt/slides/slide15.xml><?xml version="1.0" encoding="utf-8"?>
 <p:sld xmlns:a="http://schemas.openxmlformats.org/drawingml/2006/main" xmlns:r="http://schemas.openxmlformats.org/officeDocument/2006/relationships" xmlns:p="http://schemas.openxmlformats.org/presentationml/2006/main">
   <p:cSld>
     <p:spTree>
@@ -13756,7 +14281,7 @@
 </p:sld>
 </file>
 
-<file path=ppt/slides/slide15.xml><?xml version="1.0" encoding="utf-8"?>
+<file path=ppt/slides/slide16.xml><?xml version="1.0" encoding="utf-8"?>
 <p:sld xmlns:a="http://schemas.openxmlformats.org/drawingml/2006/main" xmlns:r="http://schemas.openxmlformats.org/officeDocument/2006/relationships" xmlns:p="http://schemas.openxmlformats.org/presentationml/2006/main">
   <p:cSld>
     <p:spTree>
@@ -14555,71 +15080,6 @@
 </p:sld>
 </file>
 
-<file path=ppt/slides/slide16.xml><?xml version="1.0" encoding="utf-8"?>
-<p:sld xmlns:a="http://schemas.openxmlformats.org/drawingml/2006/main" xmlns:r="http://schemas.openxmlformats.org/officeDocument/2006/relationships" xmlns:p="http://schemas.openxmlformats.org/presentationml/2006/main">
-  <p:cSld>
-    <p:spTree>
-      <p:nvGrpSpPr>
-        <p:cNvPr id="1" name=""/>
-        <p:cNvGrpSpPr/>
-        <p:nvPr/>
-      </p:nvGrpSpPr>
-      <p:grpSpPr>
-        <a:xfrm>
-          <a:off x="0" y="0"/>
-          <a:ext cx="0" cy="0"/>
-          <a:chOff x="0" y="0"/>
-          <a:chExt cx="0" cy="0"/>
-        </a:xfrm>
-      </p:grpSpPr>
-      <p:sp>
-        <p:nvSpPr>
-          <p:cNvPr id="2" name="Title 1"/>
-          <p:cNvSpPr>
-            <a:spLocks noGrp="1"/>
-          </p:cNvSpPr>
-          <p:nvPr>
-            <p:ph type="ctrTitle"/>
-          </p:nvPr>
-        </p:nvSpPr>
-        <p:spPr>
-          <a:xfrm>
-            <a:off x="518514" y="1551931"/>
-            <a:ext cx="11185200" cy="677108"/>
-          </a:xfrm>
-        </p:spPr>
-        <p:txBody>
-          <a:bodyPr/>
-          <a:lstStyle/>
-          <a:p>
-            <a:r>
-              <a:rPr lang="en-US" dirty="0"/>
-              <a:t>So it </a:t>
-            </a:r>
-            <a:r>
-              <a:rPr lang="en-US" dirty="0">
-                <a:solidFill>
-                  <a:schemeClr val="accent1"/>
-                </a:solidFill>
-              </a:rPr>
-              <a:t>comes…</a:t>
-            </a:r>
-          </a:p>
-        </p:txBody>
-      </p:sp>
-    </p:spTree>
-    <p:extLst>
-      <p:ext uri="{BB962C8B-B14F-4D97-AF65-F5344CB8AC3E}">
-        <p14:creationId xmlns:p14="http://schemas.microsoft.com/office/powerpoint/2010/main" val="3851045762"/>
-      </p:ext>
-    </p:extLst>
-  </p:cSld>
-  <p:clrMapOvr>
-    <a:masterClrMapping/>
-  </p:clrMapOvr>
-</p:sld>
-</file>
-
 <file path=ppt/slides/slide17.xml><?xml version="1.0" encoding="utf-8"?>
 <p:sld xmlns:a="http://schemas.openxmlformats.org/drawingml/2006/main" xmlns:r="http://schemas.openxmlformats.org/officeDocument/2006/relationships" xmlns:p="http://schemas.openxmlformats.org/presentationml/2006/main">
   <p:cSld>
@@ -14637,99 +15097,45 @@
           <a:chExt cx="0" cy="0"/>
         </a:xfrm>
       </p:grpSpPr>
-      <p:pic>
-        <p:nvPicPr>
-          <p:cNvPr id="4" name="Picture 3">
-            <a:extLst>
-              <a:ext uri="{FF2B5EF4-FFF2-40B4-BE49-F238E27FC236}">
-                <a16:creationId xmlns:a16="http://schemas.microsoft.com/office/drawing/2014/main" id="{862CF9DF-F9D0-47B0-A16D-574F2D82C688}"/>
-              </a:ext>
-            </a:extLst>
-          </p:cNvPr>
-          <p:cNvPicPr>
-            <a:picLocks noChangeAspect="1"/>
-          </p:cNvPicPr>
-          <p:nvPr/>
-        </p:nvPicPr>
-        <p:blipFill>
-          <a:blip r:embed="rId3"/>
-          <a:stretch>
-            <a:fillRect/>
-          </a:stretch>
-        </p:blipFill>
+      <p:sp>
+        <p:nvSpPr>
+          <p:cNvPr id="2" name="Title 1"/>
+          <p:cNvSpPr>
+            <a:spLocks noGrp="1"/>
+          </p:cNvSpPr>
+          <p:nvPr>
+            <p:ph type="ctrTitle"/>
+          </p:nvPr>
+        </p:nvSpPr>
         <p:spPr>
           <a:xfrm>
-            <a:off x="924127" y="444275"/>
-            <a:ext cx="10369685" cy="5907527"/>
+            <a:off x="518514" y="1551931"/>
+            <a:ext cx="11185200" cy="677108"/>
           </a:xfrm>
-          <a:prstGeom prst="rect">
-            <a:avLst/>
-          </a:prstGeom>
         </p:spPr>
-      </p:pic>
-      <p:sp>
-        <p:nvSpPr>
-          <p:cNvPr id="2" name="Oval 1"/>
-          <p:cNvSpPr/>
-          <p:nvPr/>
-        </p:nvSpPr>
-        <p:spPr bwMode="gray">
-          <a:xfrm>
-            <a:off x="5492743" y="1828801"/>
-            <a:ext cx="1232452" cy="410817"/>
-          </a:xfrm>
-          <a:prstGeom prst="ellipse">
-            <a:avLst/>
-          </a:prstGeom>
-          <a:solidFill>
-            <a:schemeClr val="accent1">
-              <a:alpha val="50000"/>
-            </a:schemeClr>
-          </a:solidFill>
-          <a:ln w="6350" algn="ctr">
-            <a:noFill/>
-            <a:miter lim="800000"/>
-            <a:headEnd/>
-            <a:tailEnd/>
-          </a:ln>
-        </p:spPr>
-        <p:txBody>
-          <a:bodyPr lIns="90000" tIns="72000" rIns="90000" bIns="72000" rtlCol="0" anchor="ctr"/>
+        <p:txBody>
+          <a:bodyPr/>
           <a:lstStyle/>
           <a:p>
-            <a:pPr marR="0" algn="ctr" defTabSz="914400" eaLnBrk="1" fontAlgn="base" latinLnBrk="0" hangingPunct="1">
-              <a:lnSpc>
-                <a:spcPct val="100000"/>
-              </a:lnSpc>
-              <a:spcBef>
-                <a:spcPct val="50000"/>
-              </a:spcBef>
-              <a:spcAft>
-                <a:spcPct val="0"/>
-              </a:spcAft>
-              <a:buClr>
-                <a:srgbClr val="F0AB00"/>
-              </a:buClr>
-              <a:buSzPct val="80000"/>
-              <a:tabLst/>
-            </a:pPr>
-            <a:endParaRPr kumimoji="0" lang="en-US" sz="1800" b="0" i="0" u="none" strike="noStrike" kern="0" cap="none" spc="0" normalizeH="0" baseline="0" noProof="0" dirty="0" err="1">
-              <a:ln>
-                <a:noFill/>
-              </a:ln>
-              <a:effectLst/>
-              <a:uLnTx/>
-              <a:uFillTx/>
-              <a:ea typeface="Arial Unicode MS" pitchFamily="34" charset="-128"/>
-              <a:cs typeface="Arial Unicode MS" pitchFamily="34" charset="-128"/>
-            </a:endParaRPr>
+            <a:r>
+              <a:rPr lang="en-US" dirty="0"/>
+              <a:t>So it </a:t>
+            </a:r>
+            <a:r>
+              <a:rPr lang="en-US" dirty="0">
+                <a:solidFill>
+                  <a:schemeClr val="accent1"/>
+                </a:solidFill>
+              </a:rPr>
+              <a:t>comes…</a:t>
+            </a:r>
           </a:p>
         </p:txBody>
       </p:sp>
     </p:spTree>
     <p:extLst>
       <p:ext uri="{BB962C8B-B14F-4D97-AF65-F5344CB8AC3E}">
-        <p14:creationId xmlns:p14="http://schemas.microsoft.com/office/powerpoint/2010/main" val="844780636"/>
+        <p14:creationId xmlns:p14="http://schemas.microsoft.com/office/powerpoint/2010/main" val="3851045762"/>
       </p:ext>
     </p:extLst>
   </p:cSld>
@@ -14788,14 +15194,14 @@
       </p:pic>
       <p:sp>
         <p:nvSpPr>
-          <p:cNvPr id="3" name="Oval 2"/>
+          <p:cNvPr id="2" name="Oval 1"/>
           <p:cNvSpPr/>
           <p:nvPr/>
         </p:nvSpPr>
         <p:spPr bwMode="gray">
           <a:xfrm>
-            <a:off x="6552916" y="2557670"/>
-            <a:ext cx="3028405" cy="410817"/>
+            <a:off x="5492743" y="1828801"/>
+            <a:ext cx="1232452" cy="410817"/>
           </a:xfrm>
           <a:prstGeom prst="ellipse">
             <a:avLst/>
@@ -14848,7 +15254,7 @@
     </p:spTree>
     <p:extLst>
       <p:ext uri="{BB962C8B-B14F-4D97-AF65-F5344CB8AC3E}">
-        <p14:creationId xmlns:p14="http://schemas.microsoft.com/office/powerpoint/2010/main" val="882488340"/>
+        <p14:creationId xmlns:p14="http://schemas.microsoft.com/office/powerpoint/2010/main" val="844780636"/>
       </p:ext>
     </p:extLst>
   </p:cSld>
@@ -14913,8 +15319,8 @@
         </p:nvSpPr>
         <p:spPr bwMode="gray">
           <a:xfrm>
-            <a:off x="9812951" y="2544418"/>
-            <a:ext cx="1232452" cy="410817"/>
+            <a:off x="6552916" y="2557670"/>
+            <a:ext cx="3028405" cy="410817"/>
           </a:xfrm>
           <a:prstGeom prst="ellipse">
             <a:avLst/>
@@ -14967,7 +15373,7 @@
     </p:spTree>
     <p:extLst>
       <p:ext uri="{BB962C8B-B14F-4D97-AF65-F5344CB8AC3E}">
-        <p14:creationId xmlns:p14="http://schemas.microsoft.com/office/powerpoint/2010/main" val="1869228064"/>
+        <p14:creationId xmlns:p14="http://schemas.microsoft.com/office/powerpoint/2010/main" val="882488340"/>
       </p:ext>
     </p:extLst>
   </p:cSld>
@@ -15023,7 +15429,7 @@
             <a:pPr lvl="1"/>
             <a:r>
               <a:rPr lang="en-US" altLang="zh-CN" dirty="0"/>
-              <a:t>Why need this app?</a:t>
+              <a:t>Why creates this app?</a:t>
             </a:r>
             <a:endParaRPr lang="en-US" dirty="0"/>
           </a:p>
@@ -15147,8 +15553,8 @@
         </p:nvSpPr>
         <p:spPr bwMode="gray">
           <a:xfrm>
-            <a:off x="924127" y="1126435"/>
-            <a:ext cx="10243930" cy="477079"/>
+            <a:off x="9812951" y="2544418"/>
+            <a:ext cx="1232452" cy="410817"/>
           </a:xfrm>
           <a:prstGeom prst="ellipse">
             <a:avLst/>
@@ -15201,6 +15607,125 @@
     </p:spTree>
     <p:extLst>
       <p:ext uri="{BB962C8B-B14F-4D97-AF65-F5344CB8AC3E}">
+        <p14:creationId xmlns:p14="http://schemas.microsoft.com/office/powerpoint/2010/main" val="1869228064"/>
+      </p:ext>
+    </p:extLst>
+  </p:cSld>
+  <p:clrMapOvr>
+    <a:masterClrMapping/>
+  </p:clrMapOvr>
+</p:sld>
+</file>
+
+<file path=ppt/slides/slide21.xml><?xml version="1.0" encoding="utf-8"?>
+<p:sld xmlns:a="http://schemas.openxmlformats.org/drawingml/2006/main" xmlns:r="http://schemas.openxmlformats.org/officeDocument/2006/relationships" xmlns:p="http://schemas.openxmlformats.org/presentationml/2006/main">
+  <p:cSld>
+    <p:spTree>
+      <p:nvGrpSpPr>
+        <p:cNvPr id="1" name=""/>
+        <p:cNvGrpSpPr/>
+        <p:nvPr/>
+      </p:nvGrpSpPr>
+      <p:grpSpPr>
+        <a:xfrm>
+          <a:off x="0" y="0"/>
+          <a:ext cx="0" cy="0"/>
+          <a:chOff x="0" y="0"/>
+          <a:chExt cx="0" cy="0"/>
+        </a:xfrm>
+      </p:grpSpPr>
+      <p:pic>
+        <p:nvPicPr>
+          <p:cNvPr id="4" name="Picture 3">
+            <a:extLst>
+              <a:ext uri="{FF2B5EF4-FFF2-40B4-BE49-F238E27FC236}">
+                <a16:creationId xmlns:a16="http://schemas.microsoft.com/office/drawing/2014/main" id="{862CF9DF-F9D0-47B0-A16D-574F2D82C688}"/>
+              </a:ext>
+            </a:extLst>
+          </p:cNvPr>
+          <p:cNvPicPr>
+            <a:picLocks noChangeAspect="1"/>
+          </p:cNvPicPr>
+          <p:nvPr/>
+        </p:nvPicPr>
+        <p:blipFill>
+          <a:blip r:embed="rId3"/>
+          <a:stretch>
+            <a:fillRect/>
+          </a:stretch>
+        </p:blipFill>
+        <p:spPr>
+          <a:xfrm>
+            <a:off x="924127" y="444275"/>
+            <a:ext cx="10369685" cy="5907527"/>
+          </a:xfrm>
+          <a:prstGeom prst="rect">
+            <a:avLst/>
+          </a:prstGeom>
+        </p:spPr>
+      </p:pic>
+      <p:sp>
+        <p:nvSpPr>
+          <p:cNvPr id="3" name="Oval 2"/>
+          <p:cNvSpPr/>
+          <p:nvPr/>
+        </p:nvSpPr>
+        <p:spPr bwMode="gray">
+          <a:xfrm>
+            <a:off x="924127" y="1126435"/>
+            <a:ext cx="10243930" cy="477079"/>
+          </a:xfrm>
+          <a:prstGeom prst="ellipse">
+            <a:avLst/>
+          </a:prstGeom>
+          <a:solidFill>
+            <a:schemeClr val="accent1">
+              <a:alpha val="50000"/>
+            </a:schemeClr>
+          </a:solidFill>
+          <a:ln w="6350" algn="ctr">
+            <a:noFill/>
+            <a:miter lim="800000"/>
+            <a:headEnd/>
+            <a:tailEnd/>
+          </a:ln>
+        </p:spPr>
+        <p:txBody>
+          <a:bodyPr lIns="90000" tIns="72000" rIns="90000" bIns="72000" rtlCol="0" anchor="ctr"/>
+          <a:lstStyle/>
+          <a:p>
+            <a:pPr marR="0" algn="ctr" defTabSz="914400" eaLnBrk="1" fontAlgn="base" latinLnBrk="0" hangingPunct="1">
+              <a:lnSpc>
+                <a:spcPct val="100000"/>
+              </a:lnSpc>
+              <a:spcBef>
+                <a:spcPct val="50000"/>
+              </a:spcBef>
+              <a:spcAft>
+                <a:spcPct val="0"/>
+              </a:spcAft>
+              <a:buClr>
+                <a:srgbClr val="F0AB00"/>
+              </a:buClr>
+              <a:buSzPct val="80000"/>
+              <a:tabLst/>
+            </a:pPr>
+            <a:endParaRPr kumimoji="0" lang="en-US" sz="1800" b="0" i="0" u="none" strike="noStrike" kern="0" cap="none" spc="0" normalizeH="0" baseline="0" noProof="0" dirty="0" err="1">
+              <a:ln>
+                <a:noFill/>
+              </a:ln>
+              <a:effectLst/>
+              <a:uLnTx/>
+              <a:uFillTx/>
+              <a:ea typeface="Arial Unicode MS" pitchFamily="34" charset="-128"/>
+              <a:cs typeface="Arial Unicode MS" pitchFamily="34" charset="-128"/>
+            </a:endParaRPr>
+          </a:p>
+        </p:txBody>
+      </p:sp>
+    </p:spTree>
+    <p:extLst>
+      <p:ext uri="{BB962C8B-B14F-4D97-AF65-F5344CB8AC3E}">
         <p14:creationId xmlns:p14="http://schemas.microsoft.com/office/powerpoint/2010/main" val="577799685"/>
       </p:ext>
     </p:extLst>
@@ -15211,7 +15736,7 @@
 </p:sld>
 </file>
 
-<file path=ppt/slides/slide21.xml><?xml version="1.0" encoding="utf-8"?>
+<file path=ppt/slides/slide22.xml><?xml version="1.0" encoding="utf-8"?>
 <p:sld xmlns:a="http://schemas.openxmlformats.org/drawingml/2006/main" xmlns:r="http://schemas.openxmlformats.org/officeDocument/2006/relationships" xmlns:p="http://schemas.openxmlformats.org/presentationml/2006/main">
   <p:cSld>
     <p:spTree>
@@ -15330,7 +15855,7 @@
 </p:sld>
 </file>
 
-<file path=ppt/slides/slide22.xml><?xml version="1.0" encoding="utf-8"?>
+<file path=ppt/slides/slide23.xml><?xml version="1.0" encoding="utf-8"?>
 <p:sld xmlns:a="http://schemas.openxmlformats.org/drawingml/2006/main" xmlns:r="http://schemas.openxmlformats.org/officeDocument/2006/relationships" xmlns:p="http://schemas.openxmlformats.org/presentationml/2006/main">
   <p:cSld>
     <p:spTree>
@@ -15405,7 +15930,7 @@
 </p:sld>
 </file>
 
-<file path=ppt/slides/slide23.xml><?xml version="1.0" encoding="utf-8"?>
+<file path=ppt/slides/slide24.xml><?xml version="1.0" encoding="utf-8"?>
 <p:sld xmlns:a="http://schemas.openxmlformats.org/drawingml/2006/main" xmlns:r="http://schemas.openxmlformats.org/officeDocument/2006/relationships" xmlns:p="http://schemas.openxmlformats.org/presentationml/2006/main">
   <p:cSld>
     <p:spTree>
@@ -15435,7 +15960,7 @@
 </p:sld>
 </file>
 
-<file path=ppt/slides/slide24.xml><?xml version="1.0" encoding="utf-8"?>
+<file path=ppt/slides/slide25.xml><?xml version="1.0" encoding="utf-8"?>
 <p:sld xmlns:a="http://schemas.openxmlformats.org/drawingml/2006/main" xmlns:r="http://schemas.openxmlformats.org/officeDocument/2006/relationships" xmlns:p="http://schemas.openxmlformats.org/presentationml/2006/main">
   <p:cSld>
     <p:spTree>
@@ -15515,7 +16040,7 @@
 </p:sld>
 </file>
 
-<file path=ppt/slides/slide25.xml><?xml version="1.0" encoding="utf-8"?>
+<file path=ppt/slides/slide26.xml><?xml version="1.0" encoding="utf-8"?>
 <p:sld xmlns:a="http://schemas.openxmlformats.org/drawingml/2006/main" xmlns:r="http://schemas.openxmlformats.org/officeDocument/2006/relationships" xmlns:p="http://schemas.openxmlformats.org/presentationml/2006/main">
   <p:cSld>
     <p:spTree>
@@ -15579,7 +16104,7 @@
                 <a:ea typeface="Arial Unicode MS" pitchFamily="34" charset="-128"/>
                 <a:cs typeface="Arial Unicode MS" pitchFamily="34" charset="-128"/>
               </a:rPr>
-              <a:t>HANA Cloud Platform &amp; Cloud Computing – fast, clean, stable</a:t>
+              <a:t>HANA Cloud Platform &amp; Cloud Computing – fast, clean, high stability</a:t>
             </a:r>
           </a:p>
           <a:p>
@@ -15844,81 +16369,6 @@
     <p:extLst>
       <p:ext uri="{BB962C8B-B14F-4D97-AF65-F5344CB8AC3E}">
         <p14:creationId xmlns:p14="http://schemas.microsoft.com/office/powerpoint/2010/main" val="3295641251"/>
-      </p:ext>
-    </p:extLst>
-  </p:cSld>
-  <p:clrMapOvr>
-    <a:masterClrMapping/>
-  </p:clrMapOvr>
-</p:sld>
-</file>
-
-<file path=ppt/slides/slide26.xml><?xml version="1.0" encoding="utf-8"?>
-<p:sld xmlns:a="http://schemas.openxmlformats.org/drawingml/2006/main" xmlns:r="http://schemas.openxmlformats.org/officeDocument/2006/relationships" xmlns:p="http://schemas.openxmlformats.org/presentationml/2006/main">
-  <p:cSld>
-    <p:spTree>
-      <p:nvGrpSpPr>
-        <p:cNvPr id="1" name=""/>
-        <p:cNvGrpSpPr/>
-        <p:nvPr/>
-      </p:nvGrpSpPr>
-      <p:grpSpPr>
-        <a:xfrm>
-          <a:off x="0" y="0"/>
-          <a:ext cx="0" cy="0"/>
-          <a:chOff x="0" y="0"/>
-          <a:chExt cx="0" cy="0"/>
-        </a:xfrm>
-      </p:grpSpPr>
-      <p:sp>
-        <p:nvSpPr>
-          <p:cNvPr id="2" name="Title 1">
-            <a:extLst>
-              <a:ext uri="{FF2B5EF4-FFF2-40B4-BE49-F238E27FC236}">
-                <a16:creationId xmlns:a16="http://schemas.microsoft.com/office/drawing/2014/main" id="{894B7582-0C25-46E4-9583-EFDA054C041B}"/>
-              </a:ext>
-            </a:extLst>
-          </p:cNvPr>
-          <p:cNvSpPr>
-            <a:spLocks noGrp="1"/>
-          </p:cNvSpPr>
-          <p:nvPr>
-            <p:ph type="ctrTitle"/>
-          </p:nvPr>
-        </p:nvSpPr>
-        <p:spPr>
-          <a:xfrm>
-            <a:off x="426179" y="1962038"/>
-            <a:ext cx="11185200" cy="677108"/>
-          </a:xfrm>
-        </p:spPr>
-        <p:txBody>
-          <a:bodyPr/>
-          <a:lstStyle/>
-          <a:p>
-            <a:r>
-              <a:rPr lang="en-US" dirty="0"/>
-              <a:t>Q &amp; A</a:t>
-            </a:r>
-            <a:br>
-              <a:rPr lang="en-US" dirty="0"/>
-            </a:br>
-            <a:r>
-              <a:rPr lang="en-US" dirty="0">
-                <a:solidFill>
-                  <a:schemeClr val="accent1"/>
-                </a:solidFill>
-              </a:rPr>
-              <a:t>Suggestions?</a:t>
-            </a:r>
-            <a:endParaRPr lang="en-US" dirty="0"/>
-          </a:p>
-        </p:txBody>
-      </p:sp>
-    </p:spTree>
-    <p:extLst>
-      <p:ext uri="{BB962C8B-B14F-4D97-AF65-F5344CB8AC3E}">
-        <p14:creationId xmlns:p14="http://schemas.microsoft.com/office/powerpoint/2010/main" val="3299076496"/>
       </p:ext>
     </p:extLst>
   </p:cSld>
@@ -15947,6 +16397,85 @@
       </p:grpSpPr>
       <p:sp>
         <p:nvSpPr>
+          <p:cNvPr id="2" name="Title 1">
+            <a:extLst>
+              <a:ext uri="{FF2B5EF4-FFF2-40B4-BE49-F238E27FC236}">
+                <a16:creationId xmlns:a16="http://schemas.microsoft.com/office/drawing/2014/main" id="{894B7582-0C25-46E4-9583-EFDA054C041B}"/>
+              </a:ext>
+            </a:extLst>
+          </p:cNvPr>
+          <p:cNvSpPr>
+            <a:spLocks noGrp="1"/>
+          </p:cNvSpPr>
+          <p:nvPr>
+            <p:ph type="ctrTitle"/>
+          </p:nvPr>
+        </p:nvSpPr>
+        <p:spPr>
+          <a:xfrm>
+            <a:off x="426179" y="1962038"/>
+            <a:ext cx="11185200" cy="677108"/>
+          </a:xfrm>
+        </p:spPr>
+        <p:txBody>
+          <a:bodyPr/>
+          <a:lstStyle/>
+          <a:p>
+            <a:r>
+              <a:rPr lang="en-US" dirty="0"/>
+              <a:t>Q &amp; A</a:t>
+            </a:r>
+            <a:br>
+              <a:rPr lang="en-US" dirty="0"/>
+            </a:br>
+            <a:r>
+              <a:rPr lang="en-US" altLang="zh-CN" dirty="0"/>
+              <a:t>Any </a:t>
+            </a:r>
+            <a:r>
+              <a:rPr lang="en-US" dirty="0">
+                <a:solidFill>
+                  <a:schemeClr val="accent1"/>
+                </a:solidFill>
+              </a:rPr>
+              <a:t>Suggestions?</a:t>
+            </a:r>
+            <a:endParaRPr lang="en-US" dirty="0"/>
+          </a:p>
+        </p:txBody>
+      </p:sp>
+    </p:spTree>
+    <p:extLst>
+      <p:ext uri="{BB962C8B-B14F-4D97-AF65-F5344CB8AC3E}">
+        <p14:creationId xmlns:p14="http://schemas.microsoft.com/office/powerpoint/2010/main" val="3299076496"/>
+      </p:ext>
+    </p:extLst>
+  </p:cSld>
+  <p:clrMapOvr>
+    <a:masterClrMapping/>
+  </p:clrMapOvr>
+</p:sld>
+</file>
+
+<file path=ppt/slides/slide28.xml><?xml version="1.0" encoding="utf-8"?>
+<p:sld xmlns:a="http://schemas.openxmlformats.org/drawingml/2006/main" xmlns:r="http://schemas.openxmlformats.org/officeDocument/2006/relationships" xmlns:p="http://schemas.openxmlformats.org/presentationml/2006/main">
+  <p:cSld>
+    <p:spTree>
+      <p:nvGrpSpPr>
+        <p:cNvPr id="1" name=""/>
+        <p:cNvGrpSpPr/>
+        <p:nvPr/>
+      </p:nvGrpSpPr>
+      <p:grpSpPr>
+        <a:xfrm>
+          <a:off x="0" y="0"/>
+          <a:ext cx="0" cy="0"/>
+          <a:chOff x="0" y="0"/>
+          <a:chExt cx="0" cy="0"/>
+        </a:xfrm>
+      </p:grpSpPr>
+      <p:sp>
+        <p:nvSpPr>
           <p:cNvPr id="2" name="Title 1"/>
           <p:cNvSpPr>
             <a:spLocks noGrp="1"/>
@@ -15988,6 +16517,9 @@
             </a:r>
           </a:p>
           <a:p>
+            <a:endParaRPr lang="en-US" dirty="0"/>
+          </a:p>
+          <a:p>
             <a:pPr lvl="1"/>
             <a:r>
               <a:rPr lang="en-US" b="1" dirty="0"/>
@@ -15999,20 +16531,6 @@
             <a:r>
               <a:rPr lang="en-US" dirty="0"/>
               <a:t>Product Support</a:t>
-            </a:r>
-          </a:p>
-          <a:p>
-            <a:pPr lvl="1"/>
-            <a:r>
-              <a:rPr lang="en-US" dirty="0"/>
-              <a:t>Address</a:t>
-            </a:r>
-          </a:p>
-          <a:p>
-            <a:pPr lvl="1"/>
-            <a:r>
-              <a:rPr lang="en-US" dirty="0"/>
-              <a:t>Phone number</a:t>
             </a:r>
           </a:p>
           <a:p>
@@ -16086,7 +16604,7 @@
 </p:sld>
 </file>
 
-<file path=ppt/slides/slide28.xml><?xml version="1.0" encoding="utf-8"?>
+<file path=ppt/slides/slide29.xml><?xml version="1.0" encoding="utf-8"?>
 <p:sld xmlns:a="http://schemas.openxmlformats.org/drawingml/2006/main" xmlns:r="http://schemas.openxmlformats.org/officeDocument/2006/relationships" xmlns:p="http://schemas.openxmlformats.org/presentationml/2006/main" show="0">
   <p:cSld>
     <p:spTree>
@@ -16174,7 +16692,7 @@
           <p:nvPr/>
         </p:nvPicPr>
         <p:blipFill>
-          <a:blip r:embed="rId2"/>
+          <a:blip r:embed="rId3"/>
           <a:stretch>
             <a:fillRect/>
           </a:stretch>
@@ -16626,6 +17144,164 @@
 </file>
 
 <file path=ppt/slides/slide6.xml><?xml version="1.0" encoding="utf-8"?>
+<p:sld xmlns:a="http://schemas.openxmlformats.org/drawingml/2006/main" xmlns:r="http://schemas.openxmlformats.org/officeDocument/2006/relationships" xmlns:p="http://schemas.openxmlformats.org/presentationml/2006/main">
+  <p:cSld>
+    <p:spTree>
+      <p:nvGrpSpPr>
+        <p:cNvPr id="1" name=""/>
+        <p:cNvGrpSpPr/>
+        <p:nvPr/>
+      </p:nvGrpSpPr>
+      <p:grpSpPr>
+        <a:xfrm>
+          <a:off x="0" y="0"/>
+          <a:ext cx="0" cy="0"/>
+          <a:chOff x="0" y="0"/>
+          <a:chExt cx="0" cy="0"/>
+        </a:xfrm>
+      </p:grpSpPr>
+      <p:sp>
+        <p:nvSpPr>
+          <p:cNvPr id="4" name="Title 3"/>
+          <p:cNvSpPr>
+            <a:spLocks noGrp="1"/>
+          </p:cNvSpPr>
+          <p:nvPr>
+            <p:ph type="title"/>
+          </p:nvPr>
+        </p:nvSpPr>
+        <p:spPr>
+          <a:xfrm>
+            <a:off x="377541" y="640187"/>
+            <a:ext cx="11186476" cy="369332"/>
+          </a:xfrm>
+        </p:spPr>
+        <p:txBody>
+          <a:bodyPr/>
+          <a:lstStyle/>
+          <a:p>
+            <a:r>
+              <a:rPr lang="en-US" dirty="0"/>
+              <a:t>Why create?</a:t>
+            </a:r>
+          </a:p>
+        </p:txBody>
+      </p:sp>
+      <p:sp>
+        <p:nvSpPr>
+          <p:cNvPr id="2" name="TextBox 1">
+            <a:extLst>
+              <a:ext uri="{FF2B5EF4-FFF2-40B4-BE49-F238E27FC236}">
+                <a16:creationId xmlns:a16="http://schemas.microsoft.com/office/drawing/2014/main" id="{7CBB6549-D130-4FFA-B83E-201A29BCF3A2}"/>
+              </a:ext>
+            </a:extLst>
+          </p:cNvPr>
+          <p:cNvSpPr txBox="1"/>
+          <p:nvPr/>
+        </p:nvSpPr>
+        <p:spPr>
+          <a:xfrm>
+            <a:off x="2949787" y="1909823"/>
+            <a:ext cx="6041983" cy="861774"/>
+          </a:xfrm>
+          <a:prstGeom prst="rect">
+            <a:avLst/>
+          </a:prstGeom>
+          <a:noFill/>
+        </p:spPr>
+        <p:txBody>
+          <a:bodyPr wrap="square" lIns="0" tIns="0" rIns="0" bIns="0" rtlCol="0">
+            <a:spAutoFit/>
+          </a:bodyPr>
+          <a:lstStyle/>
+          <a:p>
+            <a:pPr fontAlgn="base">
+              <a:spcBef>
+                <a:spcPct val="50000"/>
+              </a:spcBef>
+              <a:spcAft>
+                <a:spcPct val="0"/>
+              </a:spcAft>
+              <a:buClr>
+                <a:srgbClr val="F0AB00"/>
+              </a:buClr>
+              <a:buSzPct val="80000"/>
+            </a:pPr>
+            <a:r>
+              <a:rPr lang="en-CA" sz="2800" b="1" kern="0" dirty="0">
+                <a:ea typeface="Arial Unicode MS" pitchFamily="34" charset="-128"/>
+                <a:cs typeface="Arial Unicode MS" pitchFamily="34" charset="-128"/>
+              </a:rPr>
+              <a:t>Any </a:t>
+            </a:r>
+            <a:r>
+              <a:rPr lang="en-CA" sz="2800" b="1" kern="0" dirty="0">
+                <a:highlight>
+                  <a:srgbClr val="FFFF00"/>
+                </a:highlight>
+                <a:ea typeface="Arial Unicode MS" pitchFamily="34" charset="-128"/>
+                <a:cs typeface="Arial Unicode MS" pitchFamily="34" charset="-128"/>
+              </a:rPr>
+              <a:t>existed</a:t>
+            </a:r>
+            <a:r>
+              <a:rPr lang="en-CA" sz="2800" b="1" kern="0" dirty="0">
+                <a:ea typeface="Arial Unicode MS" pitchFamily="34" charset="-128"/>
+                <a:cs typeface="Arial Unicode MS" pitchFamily="34" charset="-128"/>
+              </a:rPr>
+              <a:t> application/software can help us solve these problems?</a:t>
+            </a:r>
+            <a:endParaRPr lang="en-US" sz="2800" b="1" kern="0" dirty="0" err="1">
+              <a:ea typeface="Arial Unicode MS" pitchFamily="34" charset="-128"/>
+              <a:cs typeface="Arial Unicode MS" pitchFamily="34" charset="-128"/>
+            </a:endParaRPr>
+          </a:p>
+        </p:txBody>
+      </p:sp>
+      <p:pic>
+        <p:nvPicPr>
+          <p:cNvPr id="6" name="Picture 5">
+            <a:extLst>
+              <a:ext uri="{FF2B5EF4-FFF2-40B4-BE49-F238E27FC236}">
+                <a16:creationId xmlns:a16="http://schemas.microsoft.com/office/drawing/2014/main" id="{A389D963-99F7-4517-823E-EB57DFDF5338}"/>
+              </a:ext>
+            </a:extLst>
+          </p:cNvPr>
+          <p:cNvPicPr>
+            <a:picLocks noChangeAspect="1"/>
+          </p:cNvPicPr>
+          <p:nvPr/>
+        </p:nvPicPr>
+        <p:blipFill>
+          <a:blip r:embed="rId3"/>
+          <a:stretch>
+            <a:fillRect/>
+          </a:stretch>
+        </p:blipFill>
+        <p:spPr>
+          <a:xfrm>
+            <a:off x="3629929" y="2983395"/>
+            <a:ext cx="4368178" cy="2914629"/>
+          </a:xfrm>
+          <a:prstGeom prst="rect">
+            <a:avLst/>
+          </a:prstGeom>
+        </p:spPr>
+      </p:pic>
+    </p:spTree>
+    <p:extLst>
+      <p:ext uri="{BB962C8B-B14F-4D97-AF65-F5344CB8AC3E}">
+        <p14:creationId xmlns:p14="http://schemas.microsoft.com/office/powerpoint/2010/main" val="1674767194"/>
+      </p:ext>
+    </p:extLst>
+  </p:cSld>
+  <p:clrMapOvr>
+    <a:masterClrMapping/>
+  </p:clrMapOvr>
+</p:sld>
+</file>
+
+<file path=ppt/slides/slide7.xml><?xml version="1.0" encoding="utf-8"?>
 <p:sld xmlns:a="http://schemas.openxmlformats.org/drawingml/2006/main" xmlns:r="http://schemas.openxmlformats.org/officeDocument/2006/relationships" xmlns:p="http://schemas.openxmlformats.org/presentationml/2006/main">
   <p:cSld>
     <p:spTree>
@@ -16937,7 +17613,7 @@
 </p:sld>
 </file>
 
-<file path=ppt/slides/slide7.xml><?xml version="1.0" encoding="utf-8"?>
+<file path=ppt/slides/slide8.xml><?xml version="1.0" encoding="utf-8"?>
 <p:sld xmlns:a="http://schemas.openxmlformats.org/drawingml/2006/main" xmlns:r="http://schemas.openxmlformats.org/officeDocument/2006/relationships" xmlns:p="http://schemas.openxmlformats.org/presentationml/2006/main">
   <p:cSld>
     <p:spTree>
@@ -17215,7 +17891,7 @@
 </p:sld>
 </file>
 
-<file path=ppt/slides/slide8.xml><?xml version="1.0" encoding="utf-8"?>
+<file path=ppt/slides/slide9.xml><?xml version="1.0" encoding="utf-8"?>
 <p:sld xmlns:a="http://schemas.openxmlformats.org/drawingml/2006/main" xmlns:r="http://schemas.openxmlformats.org/officeDocument/2006/relationships" xmlns:p="http://schemas.openxmlformats.org/presentationml/2006/main">
   <p:cSld>
     <p:spTree>
@@ -17772,208 +18448,6 @@
     <p:extLst>
       <p:ext uri="{BB962C8B-B14F-4D97-AF65-F5344CB8AC3E}">
         <p14:creationId xmlns:p14="http://schemas.microsoft.com/office/powerpoint/2010/main" val="1729425866"/>
-      </p:ext>
-    </p:extLst>
-  </p:cSld>
-  <p:clrMapOvr>
-    <a:masterClrMapping/>
-  </p:clrMapOvr>
-</p:sld>
-</file>
-
-<file path=ppt/slides/slide9.xml><?xml version="1.0" encoding="utf-8"?>
-<p:sld xmlns:a="http://schemas.openxmlformats.org/drawingml/2006/main" xmlns:r="http://schemas.openxmlformats.org/officeDocument/2006/relationships" xmlns:p="http://schemas.openxmlformats.org/presentationml/2006/main">
-  <p:cSld>
-    <p:spTree>
-      <p:nvGrpSpPr>
-        <p:cNvPr id="1" name=""/>
-        <p:cNvGrpSpPr/>
-        <p:nvPr/>
-      </p:nvGrpSpPr>
-      <p:grpSpPr>
-        <a:xfrm>
-          <a:off x="0" y="0"/>
-          <a:ext cx="0" cy="0"/>
-          <a:chOff x="0" y="0"/>
-          <a:chExt cx="0" cy="0"/>
-        </a:xfrm>
-      </p:grpSpPr>
-      <p:sp>
-        <p:nvSpPr>
-          <p:cNvPr id="3" name="Title 2">
-            <a:extLst>
-              <a:ext uri="{FF2B5EF4-FFF2-40B4-BE49-F238E27FC236}">
-                <a16:creationId xmlns:a16="http://schemas.microsoft.com/office/drawing/2014/main" id="{59D512E6-AC34-4273-A4E1-9E3561AEDEC1}"/>
-              </a:ext>
-            </a:extLst>
-          </p:cNvPr>
-          <p:cNvSpPr>
-            <a:spLocks noGrp="1"/>
-          </p:cNvSpPr>
-          <p:nvPr>
-            <p:ph type="title"/>
-          </p:nvPr>
-        </p:nvSpPr>
-        <p:spPr/>
-        <p:txBody>
-          <a:bodyPr/>
-          <a:lstStyle/>
-          <a:p>
-            <a:r>
-              <a:rPr lang="en-US" dirty="0"/>
-              <a:t>There are some…</a:t>
-            </a:r>
-          </a:p>
-        </p:txBody>
-      </p:sp>
-      <p:pic>
-        <p:nvPicPr>
-          <p:cNvPr id="4" name="Picture 3">
-            <a:extLst>
-              <a:ext uri="{FF2B5EF4-FFF2-40B4-BE49-F238E27FC236}">
-                <a16:creationId xmlns:a16="http://schemas.microsoft.com/office/drawing/2014/main" id="{9DB90B46-C423-4A78-B4A8-6C46B0EDC598}"/>
-              </a:ext>
-            </a:extLst>
-          </p:cNvPr>
-          <p:cNvPicPr>
-            <a:picLocks noChangeAspect="1"/>
-          </p:cNvPicPr>
-          <p:nvPr/>
-        </p:nvPicPr>
-        <p:blipFill>
-          <a:blip r:embed="rId3"/>
-          <a:stretch>
-            <a:fillRect/>
-          </a:stretch>
-        </p:blipFill>
-        <p:spPr>
-          <a:xfrm>
-            <a:off x="504001" y="1536970"/>
-            <a:ext cx="8183010" cy="5972784"/>
-          </a:xfrm>
-          <a:prstGeom prst="rect">
-            <a:avLst/>
-          </a:prstGeom>
-        </p:spPr>
-      </p:pic>
-      <p:sp>
-        <p:nvSpPr>
-          <p:cNvPr id="5" name="TextBox 4">
-            <a:extLst>
-              <a:ext uri="{FF2B5EF4-FFF2-40B4-BE49-F238E27FC236}">
-                <a16:creationId xmlns:a16="http://schemas.microsoft.com/office/drawing/2014/main" id="{72F386AC-50B1-4D5A-9969-D8C60966F904}"/>
-              </a:ext>
-            </a:extLst>
-          </p:cNvPr>
-          <p:cNvSpPr txBox="1"/>
-          <p:nvPr/>
-        </p:nvSpPr>
-        <p:spPr>
-          <a:xfrm>
-            <a:off x="5825529" y="951156"/>
-            <a:ext cx="543418" cy="307777"/>
-          </a:xfrm>
-          <a:prstGeom prst="rect">
-            <a:avLst/>
-          </a:prstGeom>
-          <a:noFill/>
-        </p:spPr>
-        <p:txBody>
-          <a:bodyPr wrap="none" lIns="0" tIns="0" rIns="0" bIns="0" rtlCol="0">
-            <a:spAutoFit/>
-          </a:bodyPr>
-          <a:lstStyle/>
-          <a:p>
-            <a:pPr fontAlgn="base">
-              <a:spcBef>
-                <a:spcPct val="50000"/>
-              </a:spcBef>
-              <a:spcAft>
-                <a:spcPct val="0"/>
-              </a:spcAft>
-              <a:buClr>
-                <a:srgbClr val="F0AB00"/>
-              </a:buClr>
-              <a:buSzPct val="80000"/>
-            </a:pPr>
-            <a:r>
-              <a:rPr lang="en-US" sz="2000" b="1" kern="0" dirty="0">
-                <a:ea typeface="Arial Unicode MS" pitchFamily="34" charset="-128"/>
-                <a:cs typeface="Arial Unicode MS" pitchFamily="34" charset="-128"/>
-              </a:rPr>
-              <a:t>BCP</a:t>
-            </a:r>
-          </a:p>
-        </p:txBody>
-      </p:sp>
-      <p:sp>
-        <p:nvSpPr>
-          <p:cNvPr id="6" name="TextBox 5">
-            <a:extLst>
-              <a:ext uri="{FF2B5EF4-FFF2-40B4-BE49-F238E27FC236}">
-                <a16:creationId xmlns:a16="http://schemas.microsoft.com/office/drawing/2014/main" id="{4A67CE65-E814-4D22-BB4C-1677A8B052B4}"/>
-              </a:ext>
-            </a:extLst>
-          </p:cNvPr>
-          <p:cNvSpPr txBox="1"/>
-          <p:nvPr/>
-        </p:nvSpPr>
-        <p:spPr>
-          <a:xfrm>
-            <a:off x="9260731" y="3414409"/>
-            <a:ext cx="2136803" cy="369332"/>
-          </a:xfrm>
-          <a:prstGeom prst="rect">
-            <a:avLst/>
-          </a:prstGeom>
-          <a:noFill/>
-        </p:spPr>
-        <p:txBody>
-          <a:bodyPr wrap="none" lIns="0" tIns="0" rIns="0" bIns="0" rtlCol="0">
-            <a:spAutoFit/>
-          </a:bodyPr>
-          <a:lstStyle/>
-          <a:p>
-            <a:pPr fontAlgn="base">
-              <a:spcBef>
-                <a:spcPct val="50000"/>
-              </a:spcBef>
-              <a:spcAft>
-                <a:spcPct val="0"/>
-              </a:spcAft>
-              <a:buClr>
-                <a:srgbClr val="F0AB00"/>
-              </a:buClr>
-              <a:buSzPct val="80000"/>
-            </a:pPr>
-            <a:r>
-              <a:rPr lang="en-US" sz="2400" kern="0" dirty="0">
-                <a:ea typeface="Arial Unicode MS" pitchFamily="34" charset="-128"/>
-                <a:cs typeface="Arial Unicode MS" pitchFamily="34" charset="-128"/>
-              </a:rPr>
-              <a:t>Cannot </a:t>
-            </a:r>
-            <a:r>
-              <a:rPr lang="en-US" sz="2400" b="1" kern="0" dirty="0">
-                <a:ea typeface="Arial Unicode MS" pitchFamily="34" charset="-128"/>
-                <a:cs typeface="Arial Unicode MS" pitchFamily="34" charset="-128"/>
-              </a:rPr>
-              <a:t>Count</a:t>
-            </a:r>
-            <a:r>
-              <a:rPr lang="en-US" sz="2400" kern="0" dirty="0">
-                <a:ea typeface="Arial Unicode MS" pitchFamily="34" charset="-128"/>
-                <a:cs typeface="Arial Unicode MS" pitchFamily="34" charset="-128"/>
-              </a:rPr>
-              <a:t>! </a:t>
-            </a:r>
-          </a:p>
-        </p:txBody>
-      </p:sp>
-    </p:spTree>
-    <p:extLst>
-      <p:ext uri="{BB962C8B-B14F-4D97-AF65-F5344CB8AC3E}">
-        <p14:creationId xmlns:p14="http://schemas.microsoft.com/office/powerpoint/2010/main" val="1387238931"/>
       </p:ext>
     </p:extLst>
   </p:cSld>

</xml_diff>

<commit_message>
small change of slides
</commit_message>
<xml_diff>
--- a/SAP_2017_16x9_black_and_white.pptx
+++ b/SAP_2017_16x9_black_and_white.pptx
@@ -728,6 +728,91 @@
       </p:grpSpPr>
       <p:sp>
         <p:nvSpPr>
+          <p:cNvPr id="2" name="Slide Image Placeholder 1"/>
+          <p:cNvSpPr>
+            <a:spLocks noGrp="1" noRot="1" noChangeAspect="1"/>
+          </p:cNvSpPr>
+          <p:nvPr>
+            <p:ph type="sldImg"/>
+          </p:nvPr>
+        </p:nvSpPr>
+        <p:spPr/>
+      </p:sp>
+      <p:sp>
+        <p:nvSpPr>
+          <p:cNvPr id="3" name="Notes Placeholder 2"/>
+          <p:cNvSpPr>
+            <a:spLocks noGrp="1"/>
+          </p:cNvSpPr>
+          <p:nvPr>
+            <p:ph type="body" idx="1"/>
+          </p:nvPr>
+        </p:nvSpPr>
+        <p:spPr/>
+        <p:txBody>
+          <a:bodyPr/>
+          <a:lstStyle/>
+          <a:p>
+            <a:endParaRPr lang="en-US" dirty="0"/>
+          </a:p>
+        </p:txBody>
+      </p:sp>
+      <p:sp>
+        <p:nvSpPr>
+          <p:cNvPr id="4" name="Slide Number Placeholder 3"/>
+          <p:cNvSpPr>
+            <a:spLocks noGrp="1"/>
+          </p:cNvSpPr>
+          <p:nvPr>
+            <p:ph type="sldNum" sz="quarter" idx="10"/>
+          </p:nvPr>
+        </p:nvSpPr>
+        <p:spPr/>
+        <p:txBody>
+          <a:bodyPr/>
+          <a:lstStyle/>
+          <a:p>
+            <a:fld id="{7D8C2C35-2B8A-446E-BEC0-FD36716C29AC}" type="slidenum">
+              <a:rPr lang="de-DE" smtClean="0"/>
+              <a:pPr/>
+              <a:t>12</a:t>
+            </a:fld>
+            <a:endParaRPr lang="de-DE" dirty="0"/>
+          </a:p>
+        </p:txBody>
+      </p:sp>
+    </p:spTree>
+    <p:extLst>
+      <p:ext uri="{BB962C8B-B14F-4D97-AF65-F5344CB8AC3E}">
+        <p14:creationId xmlns:p14="http://schemas.microsoft.com/office/powerpoint/2010/main" val="1401076059"/>
+      </p:ext>
+    </p:extLst>
+  </p:cSld>
+  <p:clrMapOvr>
+    <a:masterClrMapping/>
+  </p:clrMapOvr>
+</p:notes>
+</file>
+
+<file path=ppt/notesSlides/notesSlide11.xml><?xml version="1.0" encoding="utf-8"?>
+<p:notes xmlns:a="http://schemas.openxmlformats.org/drawingml/2006/main" xmlns:r="http://schemas.openxmlformats.org/officeDocument/2006/relationships" xmlns:p="http://schemas.openxmlformats.org/presentationml/2006/main">
+  <p:cSld>
+    <p:spTree>
+      <p:nvGrpSpPr>
+        <p:cNvPr id="1" name=""/>
+        <p:cNvGrpSpPr/>
+        <p:nvPr/>
+      </p:nvGrpSpPr>
+      <p:grpSpPr>
+        <a:xfrm>
+          <a:off x="0" y="0"/>
+          <a:ext cx="0" cy="0"/>
+          <a:chOff x="0" y="0"/>
+          <a:chExt cx="0" cy="0"/>
+        </a:xfrm>
+      </p:grpSpPr>
+      <p:sp>
+        <p:nvSpPr>
           <p:cNvPr id="4" name="Slide Number Placeholder 3"/>
           <p:cNvSpPr>
             <a:spLocks noGrp="1"/>
@@ -1399,7 +1484,7 @@
           <a:p>
             <a:r>
               <a:rPr lang="en-US" dirty="0"/>
-              <a:t>Then bring to the next chapter</a:t>
+              <a:t>So I developed the tool for the team which has multiple components, such as our team</a:t>
             </a:r>
           </a:p>
         </p:txBody>
@@ -1422,7 +1507,7 @@
             <a:fld id="{7D8C2C35-2B8A-446E-BEC0-FD36716C29AC}" type="slidenum">
               <a:rPr lang="de-DE" smtClean="0"/>
               <a:pPr/>
-              <a:t>11</a:t>
+              <a:t>9</a:t>
             </a:fld>
             <a:endParaRPr lang="de-DE" dirty="0"/>
           </a:p>
@@ -1431,7 +1516,7 @@
     </p:spTree>
     <p:extLst>
       <p:ext uri="{BB962C8B-B14F-4D97-AF65-F5344CB8AC3E}">
-        <p14:creationId xmlns:p14="http://schemas.microsoft.com/office/powerpoint/2010/main" val="1990883211"/>
+        <p14:creationId xmlns:p14="http://schemas.microsoft.com/office/powerpoint/2010/main" val="1546739270"/>
       </p:ext>
     </p:extLst>
   </p:cSld>
@@ -1485,7 +1570,10 @@
           <a:bodyPr/>
           <a:lstStyle/>
           <a:p>
-            <a:endParaRPr lang="en-US" dirty="0"/>
+            <a:r>
+              <a:rPr lang="en-US" dirty="0"/>
+              <a:t>Then bring to the next chapter</a:t>
+            </a:r>
           </a:p>
         </p:txBody>
       </p:sp>
@@ -1507,7 +1595,7 @@
             <a:fld id="{7D8C2C35-2B8A-446E-BEC0-FD36716C29AC}" type="slidenum">
               <a:rPr lang="de-DE" smtClean="0"/>
               <a:pPr/>
-              <a:t>12</a:t>
+              <a:t>11</a:t>
             </a:fld>
             <a:endParaRPr lang="de-DE" dirty="0"/>
           </a:p>
@@ -1516,7 +1604,7 @@
     </p:spTree>
     <p:extLst>
       <p:ext uri="{BB962C8B-B14F-4D97-AF65-F5344CB8AC3E}">
-        <p14:creationId xmlns:p14="http://schemas.microsoft.com/office/powerpoint/2010/main" val="1401076059"/>
+        <p14:creationId xmlns:p14="http://schemas.microsoft.com/office/powerpoint/2010/main" val="1990883211"/>
       </p:ext>
     </p:extLst>
   </p:cSld>
@@ -9106,7 +9194,7 @@
           <a:p>
             <a:r>
               <a:rPr lang="en-US" dirty="0"/>
-              <a:t>Queue Manager Web</a:t>
+              <a:t>QM Cloud Dispatcher</a:t>
             </a:r>
             <a:br>
               <a:rPr lang="en-US" dirty="0"/>
@@ -12856,8 +12944,8 @@
             </a:prstGeom>
           </p:spPr>
         </p:pic>
-        <mc:AlternateContent xmlns:mc="http://schemas.openxmlformats.org/markup-compatibility/2006">
-          <mc:Choice xmlns:p14="http://schemas.microsoft.com/office/powerpoint/2010/main" Requires="p14">
+        <mc:AlternateContent xmlns:mc="http://schemas.openxmlformats.org/markup-compatibility/2006" xmlns:p14="http://schemas.microsoft.com/office/powerpoint/2010/main">
+          <mc:Choice Requires="p14">
             <p:contentPart p14:bwMode="auto" r:id="rId3">
               <p14:nvContentPartPr>
                 <p14:cNvPr id="11" name="Ink 10">
@@ -12876,7 +12964,7 @@
               </p14:xfrm>
             </p:contentPart>
           </mc:Choice>
-          <mc:Fallback>
+          <mc:Fallback xmlns="">
             <p:pic>
               <p:nvPicPr>
                 <p:cNvPr id="11" name="Ink 10">
@@ -12907,8 +12995,8 @@
             </p:pic>
           </mc:Fallback>
         </mc:AlternateContent>
-        <mc:AlternateContent xmlns:mc="http://schemas.openxmlformats.org/markup-compatibility/2006">
-          <mc:Choice xmlns:p14="http://schemas.microsoft.com/office/powerpoint/2010/main" Requires="p14">
+        <mc:AlternateContent xmlns:mc="http://schemas.openxmlformats.org/markup-compatibility/2006" xmlns:p14="http://schemas.microsoft.com/office/powerpoint/2010/main">
+          <mc:Choice Requires="p14">
             <p:contentPart p14:bwMode="auto" r:id="rId5">
               <p14:nvContentPartPr>
                 <p14:cNvPr id="12" name="Ink 11">
@@ -12927,7 +13015,7 @@
               </p14:xfrm>
             </p:contentPart>
           </mc:Choice>
-          <mc:Fallback>
+          <mc:Fallback xmlns="">
             <p:pic>
               <p:nvPicPr>
                 <p:cNvPr id="12" name="Ink 11">
@@ -12958,8 +13046,8 @@
             </p:pic>
           </mc:Fallback>
         </mc:AlternateContent>
-        <mc:AlternateContent xmlns:mc="http://schemas.openxmlformats.org/markup-compatibility/2006">
-          <mc:Choice xmlns:p14="http://schemas.microsoft.com/office/powerpoint/2010/main" Requires="p14">
+        <mc:AlternateContent xmlns:mc="http://schemas.openxmlformats.org/markup-compatibility/2006" xmlns:p14="http://schemas.microsoft.com/office/powerpoint/2010/main">
+          <mc:Choice Requires="p14">
             <p:contentPart p14:bwMode="auto" r:id="rId7">
               <p14:nvContentPartPr>
                 <p14:cNvPr id="13" name="Ink 12">
@@ -12978,7 +13066,7 @@
               </p14:xfrm>
             </p:contentPart>
           </mc:Choice>
-          <mc:Fallback>
+          <mc:Fallback xmlns="">
             <p:pic>
               <p:nvPicPr>
                 <p:cNvPr id="13" name="Ink 12">
@@ -13661,9 +13749,9 @@
         </p:nvGrpSpPr>
         <p:grpSpPr>
           <a:xfrm>
-            <a:off x="3243673" y="4168838"/>
-            <a:ext cx="5707129" cy="914400"/>
-            <a:chOff x="3243673" y="4168838"/>
+            <a:off x="3653444" y="4102308"/>
+            <a:ext cx="4887590" cy="1295791"/>
+            <a:chOff x="3243673" y="4244798"/>
             <a:chExt cx="5707129" cy="914400"/>
           </a:xfrm>
         </p:grpSpPr>
@@ -13681,7 +13769,7 @@
           </p:nvSpPr>
           <p:spPr bwMode="gray">
             <a:xfrm>
-              <a:off x="3243673" y="4168838"/>
+              <a:off x="3243673" y="4244798"/>
               <a:ext cx="5707129" cy="914400"/>
             </a:xfrm>
             <a:prstGeom prst="roundRect">
@@ -13745,7 +13833,7 @@
           <p:spPr>
             <a:xfrm>
               <a:off x="3478733" y="4441372"/>
-              <a:ext cx="5237011" cy="369332"/>
+              <a:ext cx="5186179" cy="521253"/>
             </a:xfrm>
             <a:prstGeom prst="rect">
               <a:avLst/>
@@ -13753,7 +13841,7 @@
             <a:noFill/>
           </p:spPr>
           <p:txBody>
-            <a:bodyPr wrap="none" lIns="0" tIns="0" rIns="0" bIns="0" rtlCol="0">
+            <a:bodyPr wrap="square" lIns="0" tIns="0" rIns="0" bIns="0" rtlCol="0">
               <a:spAutoFit/>
             </a:bodyPr>
             <a:lstStyle/>
@@ -13789,7 +13877,7 @@
                   <a:ea typeface="Arial Unicode MS" pitchFamily="34" charset="-128"/>
                   <a:cs typeface="Arial Unicode MS" pitchFamily="34" charset="-128"/>
                 </a:rPr>
-                <a:t> design for dispatching…</a:t>
+                <a:t> design for multiple components dispatching…</a:t>
               </a:r>
             </a:p>
           </p:txBody>

</xml_diff>

<commit_message>
final verison of presentation slides
</commit_message>
<xml_diff>
--- a/SAP_2017_16x9_black_and_white.pptx
+++ b/SAP_2017_16x9_black_and_white.pptx
@@ -5,10 +5,10 @@
     <p:sldMasterId id="2147483733" r:id="rId1"/>
   </p:sldMasterIdLst>
   <p:notesMasterIdLst>
-    <p:notesMasterId r:id="rId17"/>
+    <p:notesMasterId r:id="rId18"/>
   </p:notesMasterIdLst>
   <p:handoutMasterIdLst>
-    <p:handoutMasterId r:id="rId18"/>
+    <p:handoutMasterId r:id="rId19"/>
   </p:handoutMasterIdLst>
   <p:sldIdLst>
     <p:sldId id="434" r:id="rId2"/>
@@ -17,15 +17,16 @@
     <p:sldId id="464" r:id="rId5"/>
     <p:sldId id="465" r:id="rId6"/>
     <p:sldId id="466" r:id="rId7"/>
-    <p:sldId id="463" r:id="rId8"/>
-    <p:sldId id="437" r:id="rId9"/>
-    <p:sldId id="443" r:id="rId10"/>
-    <p:sldId id="452" r:id="rId11"/>
-    <p:sldId id="430" r:id="rId12"/>
-    <p:sldId id="374" r:id="rId13"/>
-    <p:sldId id="453" r:id="rId14"/>
-    <p:sldId id="413" r:id="rId15"/>
-    <p:sldId id="265" r:id="rId16"/>
+    <p:sldId id="467" r:id="rId8"/>
+    <p:sldId id="463" r:id="rId9"/>
+    <p:sldId id="437" r:id="rId10"/>
+    <p:sldId id="443" r:id="rId11"/>
+    <p:sldId id="452" r:id="rId12"/>
+    <p:sldId id="430" r:id="rId13"/>
+    <p:sldId id="374" r:id="rId14"/>
+    <p:sldId id="453" r:id="rId15"/>
+    <p:sldId id="413" r:id="rId16"/>
+    <p:sldId id="265" r:id="rId17"/>
   </p:sldIdLst>
   <p:sldSz cx="12195175" cy="6858000"/>
   <p:notesSz cx="6858000" cy="9144000"/>
@@ -362,6 +363,64 @@
 </inkml:ink>
 </file>
 
+<file path=ppt/ink/ink4.xml><?xml version="1.0" encoding="utf-8"?>
+<inkml:ink xmlns:inkml="http://www.w3.org/2003/InkML">
+  <inkml:definitions>
+    <inkml:context xml:id="ctx0">
+      <inkml:inkSource xml:id="inkSrc0">
+        <inkml:traceFormat>
+          <inkml:channel name="X" type="integer" min="-2.14748E9" max="2.14748E9" units="cm"/>
+          <inkml:channel name="Y" type="integer" min="-2.14748E9" max="2.14748E9" units="cm"/>
+        </inkml:traceFormat>
+        <inkml:channelProperties>
+          <inkml:channelProperty channel="X" name="resolution" value="1000" units="1/cm"/>
+          <inkml:channelProperty channel="Y" name="resolution" value="1000" units="1/cm"/>
+        </inkml:channelProperties>
+      </inkml:inkSource>
+      <inkml:timestamp xml:id="ts0" timeString="2017-10-24T16:53:54.211"/>
+    </inkml:context>
+    <inkml:brush xml:id="br0">
+      <inkml:brushProperty name="width" value="0.16" units="cm"/>
+      <inkml:brushProperty name="height" value="0.32" units="cm"/>
+      <inkml:brushProperty name="color" value="#FFFF00"/>
+      <inkml:brushProperty name="tip" value="rectangle"/>
+      <inkml:brushProperty name="rasterOp" value="maskPen"/>
+      <inkml:brushProperty name="ignorePressure" value="1"/>
+    </inkml:brush>
+  </inkml:definitions>
+  <inkml:trace contextRef="#ctx0" brushRef="#br0">5065 1674,'0'-6,"6"0,10 0,10 0,4 3,14 0,12 2,20 0,1 1,8 1,5-1,-7 0,-3 0,-10 0,-7 0,-3 0,-6 0,-4 0,2 0,-4 0,0 0,3 6,13 1,11-1,8 4,0 1,8 3,7 0,3-4,-5-2,-3 2,-4-1,-4-1,-8-3,-1-2,-4 4,-3 1,-3-2,-3-1,4-2,10-1,3 0,3-2,9 0,3-1,1 6,0 2,-11-2,-5 1,-6-3,-10 0,-1-2,5-1,-5 0,4 0,4 0,1 0,4-1,9 1,7 0,1 0,2 0,-11 0,-4 0,-6 0,-9 0,-12 0,2 0,10 0,11 0,19 0,18 0,10 0,5 0,-9 0,-19 0,-22 0,-9 0,10 0,12-5,26-2,9-5,-1 0,-8-3,-17 1,-21 2,-9-6,-11-1,6 4,1-2,0 2,-1 5,-1 3,-7 3,-7 2,-8 1,-5 1,-4 1,-3 0,0 0,-1-1,-6-5,-1-2,6 1,14 1,4 1,6 2,-2 0,-4 2,-5 0,-9-5,-20-2,-17 2,-19-1,-20 8,-19 2,-13 2,-14-1,-13-2,6 5,-2 0,3-1,10-1,11-2,-4-2,8-1,0-1,-3 0,-15 0,3-1,-6 1,-6-1,-3 1,1 0,-4 0,11 0,12 0,8 0,7 0,4 0,3 0,-10 0,-13 0,-24 0,-14 0,-13 0,-9 0,9 0,12 0,16 0,16 0,18 0,15 0,8 0,-10-4,-9-4,-20 2,-30 0,-17 3,-15 1,-4 0,4 2,17 0,20 0,20 0,19 1,9-1,8 0,4 0,-5 0,-3 0,-11 0,-15 0,-3 0,-1 0,-7 0,-7 0,4 0,-2 0,2 0,7 0,9 0,13 0,10 0,-7 0,-1 0,-20 6,-11 0,-8 0,-12 0,-5-2,6-2,21-1,15 0,17-1,15-1,15 1</inkml:trace>
+</inkml:ink>
+</file>
+
+<file path=ppt/ink/ink5.xml><?xml version="1.0" encoding="utf-8"?>
+<inkml:ink xmlns:inkml="http://www.w3.org/2003/InkML">
+  <inkml:definitions>
+    <inkml:context xml:id="ctx0">
+      <inkml:inkSource xml:id="inkSrc0">
+        <inkml:traceFormat>
+          <inkml:channel name="X" type="integer" min="-2.14748E9" max="2.14748E9" units="cm"/>
+          <inkml:channel name="Y" type="integer" min="-2.14748E9" max="2.14748E9" units="cm"/>
+        </inkml:traceFormat>
+        <inkml:channelProperties>
+          <inkml:channelProperty channel="X" name="resolution" value="1000" units="1/cm"/>
+          <inkml:channelProperty channel="Y" name="resolution" value="1000" units="1/cm"/>
+        </inkml:channelProperties>
+      </inkml:inkSource>
+      <inkml:timestamp xml:id="ts0" timeString="2017-10-24T16:53:59.378"/>
+    </inkml:context>
+    <inkml:brush xml:id="br0">
+      <inkml:brushProperty name="width" value="0.16" units="cm"/>
+      <inkml:brushProperty name="height" value="0.32" units="cm"/>
+      <inkml:brushProperty name="color" value="#FFFF00"/>
+      <inkml:brushProperty name="tip" value="rectangle"/>
+      <inkml:brushProperty name="rasterOp" value="maskPen"/>
+      <inkml:brushProperty name="ignorePressure" value="1"/>
+    </inkml:brush>
+  </inkml:definitions>
+  <inkml:trace contextRef="#ctx0" brushRef="#br0">6411 2005,'6'0,"6"0,6 0,11 0,5 0,2 0,1-5,-2-2,4-4,5-1,7 1,8 3,6 4,1 0,-10-1,-9-2,-8 0,-6 2,-2 2,-3 2,0-1,1 2,-1 0,2 1,-1-1,6 0,2 1,5-1,5 0,1 0,-4 0,-3 0,-4 0,-4 0,-1 0,-6 10,-19 8,-15 2,-16 3,-10-4,-4 1,-5-3,-7 1,1-3,-2 1,3-2,4-3,5-4,3-3,-1-2,-1-2,1 0,3-1,0 1,3 0,0-1,1 1,0-1,0 1,0 0,0 0,0 0,0 0,0 0,-6 0,-1 0,-4 0,-7 0,0 0,9 0</inkml:trace>
+</inkml:ink>
+</file>
+
 <file path=ppt/notesMasters/notesMaster1.xml><?xml version="1.0" encoding="utf-8"?>
 <p:notesMaster xmlns:a="http://schemas.openxmlformats.org/drawingml/2006/main" xmlns:r="http://schemas.openxmlformats.org/officeDocument/2006/relationships" xmlns:p="http://schemas.openxmlformats.org/presentationml/2006/main">
   <p:cSld>
@@ -753,7 +812,10 @@
           <a:bodyPr/>
           <a:lstStyle/>
           <a:p>
-            <a:endParaRPr lang="en-US" dirty="0"/>
+            <a:r>
+              <a:rPr lang="en-US" dirty="0"/>
+              <a:t>Then bring to the next chapter</a:t>
+            </a:r>
           </a:p>
         </p:txBody>
       </p:sp>
@@ -784,6 +846,91 @@
     </p:spTree>
     <p:extLst>
       <p:ext uri="{BB962C8B-B14F-4D97-AF65-F5344CB8AC3E}">
+        <p14:creationId xmlns:p14="http://schemas.microsoft.com/office/powerpoint/2010/main" val="1990883211"/>
+      </p:ext>
+    </p:extLst>
+  </p:cSld>
+  <p:clrMapOvr>
+    <a:masterClrMapping/>
+  </p:clrMapOvr>
+</p:notes>
+</file>
+
+<file path=ppt/notesSlides/notesSlide11.xml><?xml version="1.0" encoding="utf-8"?>
+<p:notes xmlns:a="http://schemas.openxmlformats.org/drawingml/2006/main" xmlns:r="http://schemas.openxmlformats.org/officeDocument/2006/relationships" xmlns:p="http://schemas.openxmlformats.org/presentationml/2006/main">
+  <p:cSld>
+    <p:spTree>
+      <p:nvGrpSpPr>
+        <p:cNvPr id="1" name=""/>
+        <p:cNvGrpSpPr/>
+        <p:nvPr/>
+      </p:nvGrpSpPr>
+      <p:grpSpPr>
+        <a:xfrm>
+          <a:off x="0" y="0"/>
+          <a:ext cx="0" cy="0"/>
+          <a:chOff x="0" y="0"/>
+          <a:chExt cx="0" cy="0"/>
+        </a:xfrm>
+      </p:grpSpPr>
+      <p:sp>
+        <p:nvSpPr>
+          <p:cNvPr id="2" name="Slide Image Placeholder 1"/>
+          <p:cNvSpPr>
+            <a:spLocks noGrp="1" noRot="1" noChangeAspect="1"/>
+          </p:cNvSpPr>
+          <p:nvPr>
+            <p:ph type="sldImg"/>
+          </p:nvPr>
+        </p:nvSpPr>
+        <p:spPr/>
+      </p:sp>
+      <p:sp>
+        <p:nvSpPr>
+          <p:cNvPr id="3" name="Notes Placeholder 2"/>
+          <p:cNvSpPr>
+            <a:spLocks noGrp="1"/>
+          </p:cNvSpPr>
+          <p:nvPr>
+            <p:ph type="body" idx="1"/>
+          </p:nvPr>
+        </p:nvSpPr>
+        <p:spPr/>
+        <p:txBody>
+          <a:bodyPr/>
+          <a:lstStyle/>
+          <a:p>
+            <a:endParaRPr lang="en-US" dirty="0"/>
+          </a:p>
+        </p:txBody>
+      </p:sp>
+      <p:sp>
+        <p:nvSpPr>
+          <p:cNvPr id="4" name="Slide Number Placeholder 3"/>
+          <p:cNvSpPr>
+            <a:spLocks noGrp="1"/>
+          </p:cNvSpPr>
+          <p:nvPr>
+            <p:ph type="sldNum" sz="quarter" idx="10"/>
+          </p:nvPr>
+        </p:nvSpPr>
+        <p:spPr/>
+        <p:txBody>
+          <a:bodyPr/>
+          <a:lstStyle/>
+          <a:p>
+            <a:fld id="{7D8C2C35-2B8A-446E-BEC0-FD36716C29AC}" type="slidenum">
+              <a:rPr lang="de-DE" smtClean="0"/>
+              <a:pPr/>
+              <a:t>13</a:t>
+            </a:fld>
+            <a:endParaRPr lang="de-DE" dirty="0"/>
+          </a:p>
+        </p:txBody>
+      </p:sp>
+    </p:spTree>
+    <p:extLst>
+      <p:ext uri="{BB962C8B-B14F-4D97-AF65-F5344CB8AC3E}">
         <p14:creationId xmlns:p14="http://schemas.microsoft.com/office/powerpoint/2010/main" val="1401076059"/>
       </p:ext>
     </p:extLst>
@@ -794,7 +941,7 @@
 </p:notes>
 </file>
 
-<file path=ppt/notesSlides/notesSlide11.xml><?xml version="1.0" encoding="utf-8"?>
+<file path=ppt/notesSlides/notesSlide12.xml><?xml version="1.0" encoding="utf-8"?>
 <p:notes xmlns:a="http://schemas.openxmlformats.org/drawingml/2006/main" xmlns:r="http://schemas.openxmlformats.org/officeDocument/2006/relationships" xmlns:p="http://schemas.openxmlformats.org/presentationml/2006/main">
   <p:cSld>
     <p:spTree>
@@ -829,7 +976,7 @@
             <a:fld id="{7D8C2C35-2B8A-446E-BEC0-FD36716C29AC}" type="slidenum">
               <a:rPr lang="de-DE" smtClean="0"/>
               <a:pPr/>
-              <a:t>15</a:t>
+              <a:t>16</a:t>
             </a:fld>
             <a:endParaRPr lang="de-DE" dirty="0"/>
           </a:p>
@@ -1212,10 +1359,6 @@
           <a:bodyPr/>
           <a:lstStyle/>
           <a:p>
-            <a:r>
-              <a:rPr lang="en-CA" dirty="0"/>
-              <a:t>Just a quick introduction to our new QM process workflow</a:t>
-            </a:r>
             <a:endParaRPr lang="en-US" dirty="0"/>
           </a:p>
         </p:txBody>
@@ -1301,6 +1444,10 @@
           <a:bodyPr/>
           <a:lstStyle/>
           <a:p>
+            <a:r>
+              <a:rPr lang="en-US" altLang="zh-CN" dirty="0"/>
+              <a:t>combine</a:t>
+            </a:r>
             <a:endParaRPr lang="en-US" dirty="0"/>
           </a:p>
         </p:txBody>
@@ -1332,7 +1479,7 @@
     </p:spTree>
     <p:extLst>
       <p:ext uri="{BB962C8B-B14F-4D97-AF65-F5344CB8AC3E}">
-        <p14:creationId xmlns:p14="http://schemas.microsoft.com/office/powerpoint/2010/main" val="880562353"/>
+        <p14:creationId xmlns:p14="http://schemas.microsoft.com/office/powerpoint/2010/main" val="5316359"/>
       </p:ext>
     </p:extLst>
   </p:cSld>
@@ -1386,17 +1533,6 @@
           <a:bodyPr/>
           <a:lstStyle/>
           <a:p>
-            <a:r>
-              <a:rPr lang="zh-CN" altLang="en-US" dirty="0"/>
-              <a:t>采访中得知，目前为止有一些存在的工具</a:t>
-            </a:r>
-            <a:endParaRPr lang="en-CA" altLang="zh-CN" dirty="0"/>
-          </a:p>
-          <a:p>
-            <a:r>
-              <a:rPr lang="en-CA" dirty="0"/>
-              <a:t>According to my investigation, there are some existed tools. The first one is Workload Analyzer, another Java tool. So many engineers knew it was horrible</a:t>
-            </a:r>
             <a:endParaRPr lang="en-US" dirty="0"/>
           </a:p>
         </p:txBody>
@@ -1428,7 +1564,7 @@
     </p:spTree>
     <p:extLst>
       <p:ext uri="{BB962C8B-B14F-4D97-AF65-F5344CB8AC3E}">
-        <p14:creationId xmlns:p14="http://schemas.microsoft.com/office/powerpoint/2010/main" val="2911201441"/>
+        <p14:creationId xmlns:p14="http://schemas.microsoft.com/office/powerpoint/2010/main" val="880562353"/>
       </p:ext>
     </p:extLst>
   </p:cSld>
@@ -1483,9 +1619,17 @@
           <a:lstStyle/>
           <a:p>
             <a:r>
-              <a:rPr lang="en-US" dirty="0"/>
-              <a:t>So I developed the tool for the team which has multiple components, such as our team</a:t>
-            </a:r>
+              <a:rPr lang="zh-CN" altLang="en-US" dirty="0"/>
+              <a:t>采访中得知，目前为止有一些存在的工具</a:t>
+            </a:r>
+            <a:endParaRPr lang="en-CA" altLang="zh-CN" dirty="0"/>
+          </a:p>
+          <a:p>
+            <a:r>
+              <a:rPr lang="en-CA" dirty="0"/>
+              <a:t>According to my investigation, there are some existed tools. The first one is Workload Analyzer, another Java tool. So many engineers knew it was horrible</a:t>
+            </a:r>
+            <a:endParaRPr lang="en-US" dirty="0"/>
           </a:p>
         </p:txBody>
       </p:sp>
@@ -1516,7 +1660,7 @@
     </p:spTree>
     <p:extLst>
       <p:ext uri="{BB962C8B-B14F-4D97-AF65-F5344CB8AC3E}">
-        <p14:creationId xmlns:p14="http://schemas.microsoft.com/office/powerpoint/2010/main" val="1546739270"/>
+        <p14:creationId xmlns:p14="http://schemas.microsoft.com/office/powerpoint/2010/main" val="2911201441"/>
       </p:ext>
     </p:extLst>
   </p:cSld>
@@ -1572,7 +1716,7 @@
           <a:p>
             <a:r>
               <a:rPr lang="en-US" dirty="0"/>
-              <a:t>Then bring to the next chapter</a:t>
+              <a:t>So I developed the tool for the team which has multiple components, such as our team</a:t>
             </a:r>
           </a:p>
         </p:txBody>
@@ -1595,7 +1739,7 @@
             <a:fld id="{7D8C2C35-2B8A-446E-BEC0-FD36716C29AC}" type="slidenum">
               <a:rPr lang="de-DE" smtClean="0"/>
               <a:pPr/>
-              <a:t>11</a:t>
+              <a:t>10</a:t>
             </a:fld>
             <a:endParaRPr lang="de-DE" dirty="0"/>
           </a:p>
@@ -1604,7 +1748,7 @@
     </p:spTree>
     <p:extLst>
       <p:ext uri="{BB962C8B-B14F-4D97-AF65-F5344CB8AC3E}">
-        <p14:creationId xmlns:p14="http://schemas.microsoft.com/office/powerpoint/2010/main" val="1990883211"/>
+        <p14:creationId xmlns:p14="http://schemas.microsoft.com/office/powerpoint/2010/main" val="1546739270"/>
       </p:ext>
     </p:extLst>
   </p:cSld>
@@ -9259,6 +9403,266 @@
           <a:chExt cx="0" cy="0"/>
         </a:xfrm>
       </p:grpSpPr>
+      <p:sp>
+        <p:nvSpPr>
+          <p:cNvPr id="2" name="Title 1"/>
+          <p:cNvSpPr>
+            <a:spLocks noGrp="1"/>
+          </p:cNvSpPr>
+          <p:nvPr>
+            <p:ph type="ctrTitle"/>
+          </p:nvPr>
+        </p:nvSpPr>
+        <p:spPr>
+          <a:xfrm>
+            <a:off x="518514" y="931445"/>
+            <a:ext cx="11185200" cy="677108"/>
+          </a:xfrm>
+        </p:spPr>
+        <p:txBody>
+          <a:bodyPr/>
+          <a:lstStyle/>
+          <a:p>
+            <a:r>
+              <a:rPr lang="en-US" dirty="0"/>
+              <a:t>So it </a:t>
+            </a:r>
+            <a:r>
+              <a:rPr lang="en-US" dirty="0">
+                <a:solidFill>
+                  <a:schemeClr val="accent1"/>
+                </a:solidFill>
+              </a:rPr>
+              <a:t>comes…</a:t>
+            </a:r>
+          </a:p>
+        </p:txBody>
+      </p:sp>
+      <p:sp>
+        <p:nvSpPr>
+          <p:cNvPr id="3" name="Title 1">
+            <a:extLst>
+              <a:ext uri="{FF2B5EF4-FFF2-40B4-BE49-F238E27FC236}">
+                <a16:creationId xmlns:a16="http://schemas.microsoft.com/office/drawing/2014/main" id="{8C053B4F-04BF-409F-938A-9400CCE3EC21}"/>
+              </a:ext>
+            </a:extLst>
+          </p:cNvPr>
+          <p:cNvSpPr txBox="1">
+            <a:spLocks/>
+          </p:cNvSpPr>
+          <p:nvPr/>
+        </p:nvSpPr>
+        <p:spPr bwMode="gray">
+          <a:xfrm>
+            <a:off x="518514" y="4171838"/>
+            <a:ext cx="11185200" cy="677108"/>
+          </a:xfrm>
+          <a:prstGeom prst="rect">
+            <a:avLst/>
+          </a:prstGeom>
+        </p:spPr>
+        <p:txBody>
+          <a:bodyPr vert="horz" wrap="square" lIns="0" tIns="0" rIns="0" bIns="0" rtlCol="0" anchor="ctr" anchorCtr="0">
+            <a:noAutofit/>
+          </a:bodyPr>
+          <a:lstStyle>
+            <a:lvl1pPr algn="l" defTabSz="1088558" rtl="0" eaLnBrk="1" latinLnBrk="0" hangingPunct="1">
+              <a:spcBef>
+                <a:spcPct val="0"/>
+              </a:spcBef>
+              <a:buNone/>
+              <a:defRPr sz="4400" b="1" kern="1200" baseline="0">
+                <a:solidFill>
+                  <a:schemeClr val="tx1"/>
+                </a:solidFill>
+                <a:latin typeface="+mj-lt"/>
+                <a:ea typeface="+mj-ea"/>
+                <a:cs typeface="+mj-cs"/>
+              </a:defRPr>
+            </a:lvl1pPr>
+          </a:lstStyle>
+          <a:p>
+            <a:r>
+              <a:rPr lang="en-US" sz="6000" dirty="0"/>
+              <a:t>Demo</a:t>
+            </a:r>
+            <a:br>
+              <a:rPr lang="en-US" dirty="0"/>
+            </a:br>
+            <a:r>
+              <a:rPr lang="en-US" dirty="0">
+                <a:solidFill>
+                  <a:schemeClr val="accent1"/>
+                </a:solidFill>
+              </a:rPr>
+              <a:t>powered by HANA Cloud.</a:t>
+            </a:r>
+            <a:endParaRPr lang="en-US" dirty="0"/>
+          </a:p>
+        </p:txBody>
+      </p:sp>
+    </p:spTree>
+    <p:extLst>
+      <p:ext uri="{BB962C8B-B14F-4D97-AF65-F5344CB8AC3E}">
+        <p14:creationId xmlns:p14="http://schemas.microsoft.com/office/powerpoint/2010/main" val="3851045762"/>
+      </p:ext>
+    </p:extLst>
+  </p:cSld>
+  <p:clrMapOvr>
+    <a:masterClrMapping/>
+  </p:clrMapOvr>
+  <p:timing>
+    <p:tnLst>
+      <p:par>
+        <p:cTn id="1" dur="indefinite" restart="never" nodeType="tmRoot">
+          <p:childTnLst>
+            <p:seq concurrent="1" nextAc="seek">
+              <p:cTn id="2" dur="indefinite" nodeType="mainSeq">
+                <p:childTnLst>
+                  <p:par>
+                    <p:cTn id="3" fill="hold">
+                      <p:stCondLst>
+                        <p:cond delay="indefinite"/>
+                      </p:stCondLst>
+                      <p:childTnLst>
+                        <p:par>
+                          <p:cTn id="4" fill="hold">
+                            <p:stCondLst>
+                              <p:cond delay="0"/>
+                            </p:stCondLst>
+                            <p:childTnLst>
+                              <p:par>
+                                <p:cTn id="5" presetID="42" presetClass="entr" presetSubtype="0" fill="hold" grpId="0" nodeType="clickEffect">
+                                  <p:stCondLst>
+                                    <p:cond delay="0"/>
+                                  </p:stCondLst>
+                                  <p:childTnLst>
+                                    <p:set>
+                                      <p:cBhvr>
+                                        <p:cTn id="6" dur="1" fill="hold">
+                                          <p:stCondLst>
+                                            <p:cond delay="0"/>
+                                          </p:stCondLst>
+                                        </p:cTn>
+                                        <p:tgtEl>
+                                          <p:spTgt spid="3"/>
+                                        </p:tgtEl>
+                                        <p:attrNameLst>
+                                          <p:attrName>style.visibility</p:attrName>
+                                        </p:attrNameLst>
+                                      </p:cBhvr>
+                                      <p:to>
+                                        <p:strVal val="visible"/>
+                                      </p:to>
+                                    </p:set>
+                                    <p:animEffect transition="in" filter="fade">
+                                      <p:cBhvr>
+                                        <p:cTn id="7" dur="1000"/>
+                                        <p:tgtEl>
+                                          <p:spTgt spid="3"/>
+                                        </p:tgtEl>
+                                      </p:cBhvr>
+                                    </p:animEffect>
+                                    <p:anim calcmode="lin" valueType="num">
+                                      <p:cBhvr>
+                                        <p:cTn id="8" dur="1000" fill="hold"/>
+                                        <p:tgtEl>
+                                          <p:spTgt spid="3"/>
+                                        </p:tgtEl>
+                                        <p:attrNameLst>
+                                          <p:attrName>ppt_x</p:attrName>
+                                        </p:attrNameLst>
+                                      </p:cBhvr>
+                                      <p:tavLst>
+                                        <p:tav tm="0">
+                                          <p:val>
+                                            <p:strVal val="#ppt_x"/>
+                                          </p:val>
+                                        </p:tav>
+                                        <p:tav tm="100000">
+                                          <p:val>
+                                            <p:strVal val="#ppt_x"/>
+                                          </p:val>
+                                        </p:tav>
+                                      </p:tavLst>
+                                    </p:anim>
+                                    <p:anim calcmode="lin" valueType="num">
+                                      <p:cBhvr>
+                                        <p:cTn id="9" dur="1000" fill="hold"/>
+                                        <p:tgtEl>
+                                          <p:spTgt spid="3"/>
+                                        </p:tgtEl>
+                                        <p:attrNameLst>
+                                          <p:attrName>ppt_y</p:attrName>
+                                        </p:attrNameLst>
+                                      </p:cBhvr>
+                                      <p:tavLst>
+                                        <p:tav tm="0">
+                                          <p:val>
+                                            <p:strVal val="#ppt_y+.1"/>
+                                          </p:val>
+                                        </p:tav>
+                                        <p:tav tm="100000">
+                                          <p:val>
+                                            <p:strVal val="#ppt_y"/>
+                                          </p:val>
+                                        </p:tav>
+                                      </p:tavLst>
+                                    </p:anim>
+                                  </p:childTnLst>
+                                </p:cTn>
+                              </p:par>
+                            </p:childTnLst>
+                          </p:cTn>
+                        </p:par>
+                      </p:childTnLst>
+                    </p:cTn>
+                  </p:par>
+                </p:childTnLst>
+              </p:cTn>
+              <p:prevCondLst>
+                <p:cond evt="onPrev" delay="0">
+                  <p:tgtEl>
+                    <p:sldTgt/>
+                  </p:tgtEl>
+                </p:cond>
+              </p:prevCondLst>
+              <p:nextCondLst>
+                <p:cond evt="onNext" delay="0">
+                  <p:tgtEl>
+                    <p:sldTgt/>
+                  </p:tgtEl>
+                </p:cond>
+              </p:nextCondLst>
+            </p:seq>
+          </p:childTnLst>
+        </p:cTn>
+      </p:par>
+    </p:tnLst>
+    <p:bldLst>
+      <p:bldP spid="3" grpId="0"/>
+    </p:bldLst>
+  </p:timing>
+</p:sld>
+</file>
+
+<file path=ppt/slides/slide11.xml><?xml version="1.0" encoding="utf-8"?>
+<p:sld xmlns:a="http://schemas.openxmlformats.org/drawingml/2006/main" xmlns:r="http://schemas.openxmlformats.org/officeDocument/2006/relationships" xmlns:p="http://schemas.openxmlformats.org/presentationml/2006/main">
+  <p:cSld>
+    <p:spTree>
+      <p:nvGrpSpPr>
+        <p:cNvPr id="1" name=""/>
+        <p:cNvGrpSpPr/>
+        <p:nvPr/>
+      </p:nvGrpSpPr>
+      <p:grpSpPr>
+        <a:xfrm>
+          <a:off x="0" y="0"/>
+          <a:ext cx="0" cy="0"/>
+          <a:chOff x="0" y="0"/>
+          <a:chExt cx="0" cy="0"/>
+        </a:xfrm>
+      </p:grpSpPr>
     </p:spTree>
     <p:extLst>
       <p:ext uri="{BB962C8B-B14F-4D97-AF65-F5344CB8AC3E}">
@@ -9272,7 +9676,7 @@
 </p:sld>
 </file>
 
-<file path=ppt/slides/slide11.xml><?xml version="1.0" encoding="utf-8"?>
+<file path=ppt/slides/slide12.xml><?xml version="1.0" encoding="utf-8"?>
 <p:sld xmlns:a="http://schemas.openxmlformats.org/drawingml/2006/main" xmlns:r="http://schemas.openxmlformats.org/officeDocument/2006/relationships" xmlns:p="http://schemas.openxmlformats.org/presentationml/2006/main">
   <p:cSld>
     <p:spTree>
@@ -9352,7 +9756,7 @@
 </p:sld>
 </file>
 
-<file path=ppt/slides/slide12.xml><?xml version="1.0" encoding="utf-8"?>
+<file path=ppt/slides/slide13.xml><?xml version="1.0" encoding="utf-8"?>
 <p:sld xmlns:a="http://schemas.openxmlformats.org/drawingml/2006/main" xmlns:r="http://schemas.openxmlformats.org/officeDocument/2006/relationships" xmlns:p="http://schemas.openxmlformats.org/presentationml/2006/main">
   <p:cSld>
     <p:spTree>
@@ -9696,7 +10100,7 @@
 </p:sld>
 </file>
 
-<file path=ppt/slides/slide13.xml><?xml version="1.0" encoding="utf-8"?>
+<file path=ppt/slides/slide14.xml><?xml version="1.0" encoding="utf-8"?>
 <p:sld xmlns:a="http://schemas.openxmlformats.org/drawingml/2006/main" xmlns:r="http://schemas.openxmlformats.org/officeDocument/2006/relationships" xmlns:p="http://schemas.openxmlformats.org/presentationml/2006/main">
   <p:cSld>
     <p:spTree>
@@ -9825,7 +10229,7 @@
 </p:sld>
 </file>
 
-<file path=ppt/slides/slide14.xml><?xml version="1.0" encoding="utf-8"?>
+<file path=ppt/slides/slide15.xml><?xml version="1.0" encoding="utf-8"?>
 <p:sld xmlns:a="http://schemas.openxmlformats.org/drawingml/2006/main" xmlns:r="http://schemas.openxmlformats.org/officeDocument/2006/relationships" xmlns:p="http://schemas.openxmlformats.org/presentationml/2006/main">
   <p:cSld>
     <p:spTree>
@@ -9972,7 +10376,7 @@
 </p:sld>
 </file>
 
-<file path=ppt/slides/slide15.xml><?xml version="1.0" encoding="utf-8"?>
+<file path=ppt/slides/slide16.xml><?xml version="1.0" encoding="utf-8"?>
 <p:sld xmlns:a="http://schemas.openxmlformats.org/drawingml/2006/main" xmlns:r="http://schemas.openxmlformats.org/officeDocument/2006/relationships" xmlns:p="http://schemas.openxmlformats.org/presentationml/2006/main" show="0">
   <p:cSld>
     <p:spTree>
@@ -12665,7 +13069,7 @@
         <p:spPr bwMode="gray">
           <a:xfrm>
             <a:off x="2015412" y="3340359"/>
-            <a:ext cx="6718041" cy="3265714"/>
+            <a:ext cx="6718041" cy="3114870"/>
           </a:xfrm>
           <a:prstGeom prst="roundRect">
             <a:avLst/>
@@ -12788,7 +13192,7 @@
         <p:spPr>
           <a:xfrm>
             <a:off x="6783355" y="1698171"/>
-            <a:ext cx="4199868" cy="1077218"/>
+            <a:ext cx="4280018" cy="1077218"/>
           </a:xfrm>
           <a:prstGeom prst="rect">
             <a:avLst/>
@@ -12818,7 +13222,21 @@
                 <a:ea typeface="Arial Unicode MS" pitchFamily="34" charset="-128"/>
                 <a:cs typeface="Arial Unicode MS" pitchFamily="34" charset="-128"/>
               </a:rPr>
-              <a:t>Who is unavailable today?</a:t>
+              <a:t>Who is unavailable </a:t>
+            </a:r>
+            <a:r>
+              <a:rPr lang="en-US" sz="2800" b="1" kern="0" dirty="0">
+                <a:ea typeface="Arial Unicode MS" pitchFamily="34" charset="-128"/>
+                <a:cs typeface="Arial Unicode MS" pitchFamily="34" charset="-128"/>
+              </a:rPr>
+              <a:t>today</a:t>
+            </a:r>
+            <a:r>
+              <a:rPr lang="en-US" sz="2800" kern="0" dirty="0">
+                <a:ea typeface="Arial Unicode MS" pitchFamily="34" charset="-128"/>
+                <a:cs typeface="Arial Unicode MS" pitchFamily="34" charset="-128"/>
+              </a:rPr>
+              <a:t>?</a:t>
             </a:r>
           </a:p>
           <a:p>
@@ -13374,6 +13792,375 @@
       </p:grpSpPr>
       <p:sp>
         <p:nvSpPr>
+          <p:cNvPr id="4" name="Title 2">
+            <a:extLst>
+              <a:ext uri="{FF2B5EF4-FFF2-40B4-BE49-F238E27FC236}">
+                <a16:creationId xmlns:a16="http://schemas.microsoft.com/office/drawing/2014/main" id="{ACD0AEF6-4D47-4817-A82F-7EC1930AFD99}"/>
+              </a:ext>
+            </a:extLst>
+          </p:cNvPr>
+          <p:cNvSpPr txBox="1">
+            <a:spLocks/>
+          </p:cNvSpPr>
+          <p:nvPr/>
+        </p:nvSpPr>
+        <p:spPr bwMode="gray">
+          <a:xfrm>
+            <a:off x="656401" y="656400"/>
+            <a:ext cx="11186476" cy="369332"/>
+          </a:xfrm>
+          <a:prstGeom prst="rect">
+            <a:avLst/>
+          </a:prstGeom>
+        </p:spPr>
+        <p:txBody>
+          <a:bodyPr vert="horz" wrap="square" lIns="0" tIns="0" rIns="0" bIns="0" rtlCol="0" anchor="t" anchorCtr="0">
+            <a:spAutoFit/>
+          </a:bodyPr>
+          <a:lstStyle>
+            <a:lvl1pPr algn="l" defTabSz="1088558" rtl="0" eaLnBrk="1" latinLnBrk="0" hangingPunct="1">
+              <a:spcBef>
+                <a:spcPct val="0"/>
+              </a:spcBef>
+              <a:buNone/>
+              <a:defRPr sz="2400" b="1" kern="1200" baseline="0">
+                <a:solidFill>
+                  <a:schemeClr val="tx1"/>
+                </a:solidFill>
+                <a:latin typeface="+mj-lt"/>
+                <a:ea typeface="+mj-ea"/>
+                <a:cs typeface="+mj-cs"/>
+              </a:defRPr>
+            </a:lvl1pPr>
+          </a:lstStyle>
+          <a:p>
+            <a:r>
+              <a:rPr lang="en-US"/>
+              <a:t>For example…</a:t>
+            </a:r>
+            <a:endParaRPr lang="en-US" dirty="0"/>
+          </a:p>
+        </p:txBody>
+      </p:sp>
+      <p:pic>
+        <p:nvPicPr>
+          <p:cNvPr id="5" name="Picture 4">
+            <a:extLst>
+              <a:ext uri="{FF2B5EF4-FFF2-40B4-BE49-F238E27FC236}">
+                <a16:creationId xmlns:a16="http://schemas.microsoft.com/office/drawing/2014/main" id="{5DDA7812-6636-4E9F-9EAC-0D5F718B0CBB}"/>
+              </a:ext>
+            </a:extLst>
+          </p:cNvPr>
+          <p:cNvPicPr>
+            <a:picLocks noChangeAspect="1"/>
+          </p:cNvPicPr>
+          <p:nvPr/>
+        </p:nvPicPr>
+        <p:blipFill>
+          <a:blip r:embed="rId3"/>
+          <a:stretch>
+            <a:fillRect/>
+          </a:stretch>
+        </p:blipFill>
+        <p:spPr>
+          <a:xfrm>
+            <a:off x="656401" y="1583189"/>
+            <a:ext cx="3457575" cy="3648075"/>
+          </a:xfrm>
+          <a:prstGeom prst="rect">
+            <a:avLst/>
+          </a:prstGeom>
+        </p:spPr>
+      </p:pic>
+      <p:pic>
+        <p:nvPicPr>
+          <p:cNvPr id="6" name="Picture 5">
+            <a:extLst>
+              <a:ext uri="{FF2B5EF4-FFF2-40B4-BE49-F238E27FC236}">
+                <a16:creationId xmlns:a16="http://schemas.microsoft.com/office/drawing/2014/main" id="{FA4D38CF-DEED-4D09-BFB4-DEBD6882B189}"/>
+              </a:ext>
+            </a:extLst>
+          </p:cNvPr>
+          <p:cNvPicPr>
+            <a:picLocks noChangeAspect="1"/>
+          </p:cNvPicPr>
+          <p:nvPr/>
+        </p:nvPicPr>
+        <p:blipFill>
+          <a:blip r:embed="rId4"/>
+          <a:stretch>
+            <a:fillRect/>
+          </a:stretch>
+        </p:blipFill>
+        <p:spPr>
+          <a:xfrm>
+            <a:off x="4672919" y="1583189"/>
+            <a:ext cx="3371850" cy="3381375"/>
+          </a:xfrm>
+          <a:prstGeom prst="rect">
+            <a:avLst/>
+          </a:prstGeom>
+        </p:spPr>
+      </p:pic>
+      <p:sp>
+        <p:nvSpPr>
+          <p:cNvPr id="7" name="TextBox 6">
+            <a:extLst>
+              <a:ext uri="{FF2B5EF4-FFF2-40B4-BE49-F238E27FC236}">
+                <a16:creationId xmlns:a16="http://schemas.microsoft.com/office/drawing/2014/main" id="{C9B496C2-DA61-4250-B81C-DE20FBC53657}"/>
+              </a:ext>
+            </a:extLst>
+          </p:cNvPr>
+          <p:cNvSpPr txBox="1"/>
+          <p:nvPr/>
+        </p:nvSpPr>
+        <p:spPr>
+          <a:xfrm>
+            <a:off x="8603712" y="2976339"/>
+            <a:ext cx="3079369" cy="430887"/>
+          </a:xfrm>
+          <a:prstGeom prst="rect">
+            <a:avLst/>
+          </a:prstGeom>
+          <a:noFill/>
+        </p:spPr>
+        <p:txBody>
+          <a:bodyPr wrap="none" lIns="0" tIns="0" rIns="0" bIns="0" rtlCol="0">
+            <a:spAutoFit/>
+          </a:bodyPr>
+          <a:lstStyle/>
+          <a:p>
+            <a:pPr fontAlgn="base">
+              <a:spcBef>
+                <a:spcPct val="50000"/>
+              </a:spcBef>
+              <a:spcAft>
+                <a:spcPct val="0"/>
+              </a:spcAft>
+              <a:buClr>
+                <a:srgbClr val="F0AB00"/>
+              </a:buClr>
+              <a:buSzPct val="80000"/>
+            </a:pPr>
+            <a:r>
+              <a:rPr lang="en-US" sz="2800" kern="0" dirty="0">
+                <a:ea typeface="Arial Unicode MS" pitchFamily="34" charset="-128"/>
+                <a:cs typeface="Arial Unicode MS" pitchFamily="34" charset="-128"/>
+              </a:rPr>
+              <a:t>Check components</a:t>
+            </a:r>
+          </a:p>
+        </p:txBody>
+      </p:sp>
+      <mc:AlternateContent xmlns:mc="http://schemas.openxmlformats.org/markup-compatibility/2006">
+        <mc:Choice xmlns:p14="http://schemas.microsoft.com/office/powerpoint/2010/main" Requires="p14">
+          <p:contentPart p14:bwMode="auto" r:id="rId5">
+            <p14:nvContentPartPr>
+              <p14:cNvPr id="9" name="Ink 8">
+                <a:extLst>
+                  <a:ext uri="{FF2B5EF4-FFF2-40B4-BE49-F238E27FC236}">
+                    <a16:creationId xmlns:a16="http://schemas.microsoft.com/office/drawing/2014/main" id="{8835B25C-4EB0-400E-899F-63BB0CCE4216}"/>
+                  </a:ext>
+                </a:extLst>
+              </p14:cNvPr>
+              <p14:cNvContentPartPr/>
+              <p14:nvPr/>
+            </p14:nvContentPartPr>
+            <p14:xfrm>
+              <a:off x="4669855" y="2168417"/>
+              <a:ext cx="2789568" cy="85536"/>
+            </p14:xfrm>
+          </p:contentPart>
+        </mc:Choice>
+        <mc:Fallback>
+          <p:pic>
+            <p:nvPicPr>
+              <p:cNvPr id="9" name="Ink 8">
+                <a:extLst>
+                  <a:ext uri="{FF2B5EF4-FFF2-40B4-BE49-F238E27FC236}">
+                    <a16:creationId xmlns:a16="http://schemas.microsoft.com/office/drawing/2014/main" id="{8835B25C-4EB0-400E-899F-63BB0CCE4216}"/>
+                  </a:ext>
+                </a:extLst>
+              </p:cNvPr>
+              <p:cNvPicPr/>
+              <p:nvPr/>
+            </p:nvPicPr>
+            <p:blipFill>
+              <a:blip r:embed="rId6"/>
+              <a:stretch>
+                <a:fillRect/>
+              </a:stretch>
+            </p:blipFill>
+            <p:spPr>
+              <a:xfrm>
+                <a:off x="4641056" y="2110914"/>
+                <a:ext cx="2846807" cy="200183"/>
+              </a:xfrm>
+              <a:prstGeom prst="rect">
+                <a:avLst/>
+              </a:prstGeom>
+            </p:spPr>
+          </p:pic>
+        </mc:Fallback>
+      </mc:AlternateContent>
+      <mc:AlternateContent xmlns:mc="http://schemas.openxmlformats.org/markup-compatibility/2006">
+        <mc:Choice xmlns:p14="http://schemas.microsoft.com/office/powerpoint/2010/main" Requires="p14">
+          <p:contentPart p14:bwMode="auto" r:id="rId7">
+            <p14:nvContentPartPr>
+              <p14:cNvPr id="10" name="Ink 9">
+                <a:extLst>
+                  <a:ext uri="{FF2B5EF4-FFF2-40B4-BE49-F238E27FC236}">
+                    <a16:creationId xmlns:a16="http://schemas.microsoft.com/office/drawing/2014/main" id="{AB6752F7-300D-4299-AE54-5F33DC28257F}"/>
+                  </a:ext>
+                </a:extLst>
+              </p14:cNvPr>
+              <p14:cNvContentPartPr/>
+              <p14:nvPr/>
+            </p14:nvContentPartPr>
+            <p14:xfrm>
+              <a:off x="6607519" y="2633825"/>
+              <a:ext cx="482112" cy="78048"/>
+            </p14:xfrm>
+          </p:contentPart>
+        </mc:Choice>
+        <mc:Fallback>
+          <p:pic>
+            <p:nvPicPr>
+              <p:cNvPr id="10" name="Ink 9">
+                <a:extLst>
+                  <a:ext uri="{FF2B5EF4-FFF2-40B4-BE49-F238E27FC236}">
+                    <a16:creationId xmlns:a16="http://schemas.microsoft.com/office/drawing/2014/main" id="{AB6752F7-300D-4299-AE54-5F33DC28257F}"/>
+                  </a:ext>
+                </a:extLst>
+              </p:cNvPr>
+              <p:cNvPicPr/>
+              <p:nvPr/>
+            </p:nvPicPr>
+            <p:blipFill>
+              <a:blip r:embed="rId8"/>
+              <a:stretch>
+                <a:fillRect/>
+              </a:stretch>
+            </p:blipFill>
+            <p:spPr>
+              <a:xfrm>
+                <a:off x="6578715" y="2576278"/>
+                <a:ext cx="539361" cy="192782"/>
+              </a:xfrm>
+              <a:prstGeom prst="rect">
+                <a:avLst/>
+              </a:prstGeom>
+            </p:spPr>
+          </p:pic>
+        </mc:Fallback>
+      </mc:AlternateContent>
+    </p:spTree>
+    <p:extLst>
+      <p:ext uri="{BB962C8B-B14F-4D97-AF65-F5344CB8AC3E}">
+        <p14:creationId xmlns:p14="http://schemas.microsoft.com/office/powerpoint/2010/main" val="1333874690"/>
+      </p:ext>
+    </p:extLst>
+  </p:cSld>
+  <p:clrMapOvr>
+    <a:masterClrMapping/>
+  </p:clrMapOvr>
+  <p:timing>
+    <p:tnLst>
+      <p:par>
+        <p:cTn id="1" dur="indefinite" restart="never" nodeType="tmRoot">
+          <p:childTnLst>
+            <p:seq concurrent="1" nextAc="seek">
+              <p:cTn id="2" dur="indefinite" nodeType="mainSeq">
+                <p:childTnLst>
+                  <p:par>
+                    <p:cTn id="3" fill="hold">
+                      <p:stCondLst>
+                        <p:cond delay="indefinite"/>
+                      </p:stCondLst>
+                      <p:childTnLst>
+                        <p:par>
+                          <p:cTn id="4" fill="hold">
+                            <p:stCondLst>
+                              <p:cond delay="0"/>
+                            </p:stCondLst>
+                            <p:childTnLst>
+                              <p:par>
+                                <p:cTn id="5" presetID="1" presetClass="entr" presetSubtype="0" fill="hold" nodeType="clickEffect">
+                                  <p:stCondLst>
+                                    <p:cond delay="0"/>
+                                  </p:stCondLst>
+                                  <p:childTnLst>
+                                    <p:set>
+                                      <p:cBhvr>
+                                        <p:cTn id="6" dur="1" fill="hold">
+                                          <p:stCondLst>
+                                            <p:cond delay="0"/>
+                                          </p:stCondLst>
+                                        </p:cTn>
+                                        <p:tgtEl>
+                                          <p:spTgt spid="5"/>
+                                        </p:tgtEl>
+                                        <p:attrNameLst>
+                                          <p:attrName>style.visibility</p:attrName>
+                                        </p:attrNameLst>
+                                      </p:cBhvr>
+                                      <p:to>
+                                        <p:strVal val="visible"/>
+                                      </p:to>
+                                    </p:set>
+                                  </p:childTnLst>
+                                </p:cTn>
+                              </p:par>
+                            </p:childTnLst>
+                          </p:cTn>
+                        </p:par>
+                      </p:childTnLst>
+                    </p:cTn>
+                  </p:par>
+                </p:childTnLst>
+              </p:cTn>
+              <p:prevCondLst>
+                <p:cond evt="onPrev" delay="0">
+                  <p:tgtEl>
+                    <p:sldTgt/>
+                  </p:tgtEl>
+                </p:cond>
+              </p:prevCondLst>
+              <p:nextCondLst>
+                <p:cond evt="onNext" delay="0">
+                  <p:tgtEl>
+                    <p:sldTgt/>
+                  </p:tgtEl>
+                </p:cond>
+              </p:nextCondLst>
+            </p:seq>
+          </p:childTnLst>
+        </p:cTn>
+      </p:par>
+    </p:tnLst>
+  </p:timing>
+</p:sld>
+</file>
+
+<file path=ppt/slides/slide8.xml><?xml version="1.0" encoding="utf-8"?>
+<p:sld xmlns:a="http://schemas.openxmlformats.org/drawingml/2006/main" xmlns:r="http://schemas.openxmlformats.org/officeDocument/2006/relationships" xmlns:p="http://schemas.openxmlformats.org/presentationml/2006/main">
+  <p:cSld>
+    <p:spTree>
+      <p:nvGrpSpPr>
+        <p:cNvPr id="1" name=""/>
+        <p:cNvGrpSpPr/>
+        <p:nvPr/>
+      </p:nvGrpSpPr>
+      <p:grpSpPr>
+        <a:xfrm>
+          <a:off x="0" y="0"/>
+          <a:ext cx="0" cy="0"/>
+          <a:chOff x="0" y="0"/>
+          <a:chExt cx="0" cy="0"/>
+        </a:xfrm>
+      </p:grpSpPr>
+      <p:sp>
+        <p:nvSpPr>
           <p:cNvPr id="4" name="Title 3"/>
           <p:cNvSpPr>
             <a:spLocks noGrp="1"/>
@@ -13513,7 +14300,7 @@
 </p:sld>
 </file>
 
-<file path=ppt/slides/slide8.xml><?xml version="1.0" encoding="utf-8"?>
+<file path=ppt/slides/slide9.xml><?xml version="1.0" encoding="utf-8"?>
 <p:sld xmlns:a="http://schemas.openxmlformats.org/drawingml/2006/main" xmlns:r="http://schemas.openxmlformats.org/officeDocument/2006/relationships" xmlns:p="http://schemas.openxmlformats.org/presentationml/2006/main">
   <p:cSld>
     <p:spTree>
@@ -13967,266 +14754,6 @@
         </p:cTn>
       </p:par>
     </p:tnLst>
-  </p:timing>
-</p:sld>
-</file>
-
-<file path=ppt/slides/slide9.xml><?xml version="1.0" encoding="utf-8"?>
-<p:sld xmlns:a="http://schemas.openxmlformats.org/drawingml/2006/main" xmlns:r="http://schemas.openxmlformats.org/officeDocument/2006/relationships" xmlns:p="http://schemas.openxmlformats.org/presentationml/2006/main">
-  <p:cSld>
-    <p:spTree>
-      <p:nvGrpSpPr>
-        <p:cNvPr id="1" name=""/>
-        <p:cNvGrpSpPr/>
-        <p:nvPr/>
-      </p:nvGrpSpPr>
-      <p:grpSpPr>
-        <a:xfrm>
-          <a:off x="0" y="0"/>
-          <a:ext cx="0" cy="0"/>
-          <a:chOff x="0" y="0"/>
-          <a:chExt cx="0" cy="0"/>
-        </a:xfrm>
-      </p:grpSpPr>
-      <p:sp>
-        <p:nvSpPr>
-          <p:cNvPr id="2" name="Title 1"/>
-          <p:cNvSpPr>
-            <a:spLocks noGrp="1"/>
-          </p:cNvSpPr>
-          <p:nvPr>
-            <p:ph type="ctrTitle"/>
-          </p:nvPr>
-        </p:nvSpPr>
-        <p:spPr>
-          <a:xfrm>
-            <a:off x="518514" y="931445"/>
-            <a:ext cx="11185200" cy="677108"/>
-          </a:xfrm>
-        </p:spPr>
-        <p:txBody>
-          <a:bodyPr/>
-          <a:lstStyle/>
-          <a:p>
-            <a:r>
-              <a:rPr lang="en-US" dirty="0"/>
-              <a:t>So it </a:t>
-            </a:r>
-            <a:r>
-              <a:rPr lang="en-US" dirty="0">
-                <a:solidFill>
-                  <a:schemeClr val="accent1"/>
-                </a:solidFill>
-              </a:rPr>
-              <a:t>comes…</a:t>
-            </a:r>
-          </a:p>
-        </p:txBody>
-      </p:sp>
-      <p:sp>
-        <p:nvSpPr>
-          <p:cNvPr id="3" name="Title 1">
-            <a:extLst>
-              <a:ext uri="{FF2B5EF4-FFF2-40B4-BE49-F238E27FC236}">
-                <a16:creationId xmlns:a16="http://schemas.microsoft.com/office/drawing/2014/main" id="{8C053B4F-04BF-409F-938A-9400CCE3EC21}"/>
-              </a:ext>
-            </a:extLst>
-          </p:cNvPr>
-          <p:cNvSpPr txBox="1">
-            <a:spLocks/>
-          </p:cNvSpPr>
-          <p:nvPr/>
-        </p:nvSpPr>
-        <p:spPr bwMode="gray">
-          <a:xfrm>
-            <a:off x="518514" y="4171838"/>
-            <a:ext cx="11185200" cy="677108"/>
-          </a:xfrm>
-          <a:prstGeom prst="rect">
-            <a:avLst/>
-          </a:prstGeom>
-        </p:spPr>
-        <p:txBody>
-          <a:bodyPr vert="horz" wrap="square" lIns="0" tIns="0" rIns="0" bIns="0" rtlCol="0" anchor="ctr" anchorCtr="0">
-            <a:noAutofit/>
-          </a:bodyPr>
-          <a:lstStyle>
-            <a:lvl1pPr algn="l" defTabSz="1088558" rtl="0" eaLnBrk="1" latinLnBrk="0" hangingPunct="1">
-              <a:spcBef>
-                <a:spcPct val="0"/>
-              </a:spcBef>
-              <a:buNone/>
-              <a:defRPr sz="4400" b="1" kern="1200" baseline="0">
-                <a:solidFill>
-                  <a:schemeClr val="tx1"/>
-                </a:solidFill>
-                <a:latin typeface="+mj-lt"/>
-                <a:ea typeface="+mj-ea"/>
-                <a:cs typeface="+mj-cs"/>
-              </a:defRPr>
-            </a:lvl1pPr>
-          </a:lstStyle>
-          <a:p>
-            <a:r>
-              <a:rPr lang="en-US" sz="6000" dirty="0"/>
-              <a:t>Demo</a:t>
-            </a:r>
-            <a:br>
-              <a:rPr lang="en-US" dirty="0"/>
-            </a:br>
-            <a:r>
-              <a:rPr lang="en-US" dirty="0">
-                <a:solidFill>
-                  <a:schemeClr val="accent1"/>
-                </a:solidFill>
-              </a:rPr>
-              <a:t>powered by HANA Cloud.</a:t>
-            </a:r>
-            <a:endParaRPr lang="en-US" dirty="0"/>
-          </a:p>
-        </p:txBody>
-      </p:sp>
-    </p:spTree>
-    <p:extLst>
-      <p:ext uri="{BB962C8B-B14F-4D97-AF65-F5344CB8AC3E}">
-        <p14:creationId xmlns:p14="http://schemas.microsoft.com/office/powerpoint/2010/main" val="3851045762"/>
-      </p:ext>
-    </p:extLst>
-  </p:cSld>
-  <p:clrMapOvr>
-    <a:masterClrMapping/>
-  </p:clrMapOvr>
-  <p:timing>
-    <p:tnLst>
-      <p:par>
-        <p:cTn id="1" dur="indefinite" restart="never" nodeType="tmRoot">
-          <p:childTnLst>
-            <p:seq concurrent="1" nextAc="seek">
-              <p:cTn id="2" dur="indefinite" nodeType="mainSeq">
-                <p:childTnLst>
-                  <p:par>
-                    <p:cTn id="3" fill="hold">
-                      <p:stCondLst>
-                        <p:cond delay="indefinite"/>
-                      </p:stCondLst>
-                      <p:childTnLst>
-                        <p:par>
-                          <p:cTn id="4" fill="hold">
-                            <p:stCondLst>
-                              <p:cond delay="0"/>
-                            </p:stCondLst>
-                            <p:childTnLst>
-                              <p:par>
-                                <p:cTn id="5" presetID="42" presetClass="entr" presetSubtype="0" fill="hold" grpId="0" nodeType="clickEffect">
-                                  <p:stCondLst>
-                                    <p:cond delay="0"/>
-                                  </p:stCondLst>
-                                  <p:childTnLst>
-                                    <p:set>
-                                      <p:cBhvr>
-                                        <p:cTn id="6" dur="1" fill="hold">
-                                          <p:stCondLst>
-                                            <p:cond delay="0"/>
-                                          </p:stCondLst>
-                                        </p:cTn>
-                                        <p:tgtEl>
-                                          <p:spTgt spid="3"/>
-                                        </p:tgtEl>
-                                        <p:attrNameLst>
-                                          <p:attrName>style.visibility</p:attrName>
-                                        </p:attrNameLst>
-                                      </p:cBhvr>
-                                      <p:to>
-                                        <p:strVal val="visible"/>
-                                      </p:to>
-                                    </p:set>
-                                    <p:animEffect transition="in" filter="fade">
-                                      <p:cBhvr>
-                                        <p:cTn id="7" dur="1000"/>
-                                        <p:tgtEl>
-                                          <p:spTgt spid="3"/>
-                                        </p:tgtEl>
-                                      </p:cBhvr>
-                                    </p:animEffect>
-                                    <p:anim calcmode="lin" valueType="num">
-                                      <p:cBhvr>
-                                        <p:cTn id="8" dur="1000" fill="hold"/>
-                                        <p:tgtEl>
-                                          <p:spTgt spid="3"/>
-                                        </p:tgtEl>
-                                        <p:attrNameLst>
-                                          <p:attrName>ppt_x</p:attrName>
-                                        </p:attrNameLst>
-                                      </p:cBhvr>
-                                      <p:tavLst>
-                                        <p:tav tm="0">
-                                          <p:val>
-                                            <p:strVal val="#ppt_x"/>
-                                          </p:val>
-                                        </p:tav>
-                                        <p:tav tm="100000">
-                                          <p:val>
-                                            <p:strVal val="#ppt_x"/>
-                                          </p:val>
-                                        </p:tav>
-                                      </p:tavLst>
-                                    </p:anim>
-                                    <p:anim calcmode="lin" valueType="num">
-                                      <p:cBhvr>
-                                        <p:cTn id="9" dur="1000" fill="hold"/>
-                                        <p:tgtEl>
-                                          <p:spTgt spid="3"/>
-                                        </p:tgtEl>
-                                        <p:attrNameLst>
-                                          <p:attrName>ppt_y</p:attrName>
-                                        </p:attrNameLst>
-                                      </p:cBhvr>
-                                      <p:tavLst>
-                                        <p:tav tm="0">
-                                          <p:val>
-                                            <p:strVal val="#ppt_y+.1"/>
-                                          </p:val>
-                                        </p:tav>
-                                        <p:tav tm="100000">
-                                          <p:val>
-                                            <p:strVal val="#ppt_y"/>
-                                          </p:val>
-                                        </p:tav>
-                                      </p:tavLst>
-                                    </p:anim>
-                                  </p:childTnLst>
-                                </p:cTn>
-                              </p:par>
-                            </p:childTnLst>
-                          </p:cTn>
-                        </p:par>
-                      </p:childTnLst>
-                    </p:cTn>
-                  </p:par>
-                </p:childTnLst>
-              </p:cTn>
-              <p:prevCondLst>
-                <p:cond evt="onPrev" delay="0">
-                  <p:tgtEl>
-                    <p:sldTgt/>
-                  </p:tgtEl>
-                </p:cond>
-              </p:prevCondLst>
-              <p:nextCondLst>
-                <p:cond evt="onNext" delay="0">
-                  <p:tgtEl>
-                    <p:sldTgt/>
-                  </p:tgtEl>
-                </p:cond>
-              </p:nextCondLst>
-            </p:seq>
-          </p:childTnLst>
-        </p:cTn>
-      </p:par>
-    </p:tnLst>
-    <p:bldLst>
-      <p:bldP spid="3" grpId="0"/>
-    </p:bldLst>
   </p:timing>
 </p:sld>
 </file>

</xml_diff>